<commit_message>
Tests rädi und Autorenverzeichnis
</commit_message>
<xml_diff>
--- a/Bachelorarbeit/Schaubilder BA.pptx
+++ b/Bachelorarbeit/Schaubilder BA.pptx
@@ -5,18 +5,19 @@
     <p:sldMasterId id="2147483668" r:id="rId1"/>
   </p:sldMasterIdLst>
   <p:notesMasterIdLst>
-    <p:notesMasterId r:id="rId6"/>
+    <p:notesMasterId r:id="rId7"/>
   </p:notesMasterIdLst>
   <p:sldIdLst>
     <p:sldId id="599" r:id="rId2"/>
     <p:sldId id="615" r:id="rId3"/>
     <p:sldId id="617" r:id="rId4"/>
-    <p:sldId id="618" r:id="rId5"/>
+    <p:sldId id="619" r:id="rId5"/>
+    <p:sldId id="618" r:id="rId6"/>
   </p:sldIdLst>
   <p:sldSz cx="12192000" cy="6858000"/>
   <p:notesSz cx="6858000" cy="9144000"/>
   <p:custDataLst>
-    <p:tags r:id="rId7"/>
+    <p:tags r:id="rId8"/>
   </p:custDataLst>
   <p:defaultTextStyle>
     <a:defPPr>
@@ -284,7 +285,7 @@
               <a:pPr>
                 <a:defRPr/>
               </a:pPr>
-              <a:t>07.02.2019</a:t>
+              <a:t>16.02.2019</a:t>
             </a:fld>
             <a:endParaRPr lang="de-DE" dirty="0"/>
           </a:p>
@@ -791,14 +792,14 @@
           </a:ln>
           <a:extLst>
             <a:ext uri="{909E8E84-426E-40dd-AFC4-6F175D3DCCD1}">
-              <a14:hiddenFill xmlns:a14="http://schemas.microsoft.com/office/drawing/2010/main" xmlns="">
+              <a14:hiddenFill xmlns="" xmlns:a14="http://schemas.microsoft.com/office/drawing/2010/main">
                 <a:solidFill>
                   <a:srgbClr val="FFFFFF"/>
                 </a:solidFill>
               </a14:hiddenFill>
             </a:ext>
             <a:ext uri="{91240B29-F687-4f45-9708-019B960494DF}">
-              <a14:hiddenLine xmlns:a14="http://schemas.microsoft.com/office/drawing/2010/main" xmlns="" w="9525">
+              <a14:hiddenLine xmlns="" xmlns:a14="http://schemas.microsoft.com/office/drawing/2010/main" w="9525">
                 <a:solidFill>
                   <a:srgbClr val="000000"/>
                 </a:solidFill>
@@ -1291,14 +1292,14 @@
           </a:ln>
           <a:extLst>
             <a:ext uri="{909E8E84-426E-40dd-AFC4-6F175D3DCCD1}">
-              <a14:hiddenFill xmlns:a14="http://schemas.microsoft.com/office/drawing/2010/main" xmlns="">
+              <a14:hiddenFill xmlns="" xmlns:a14="http://schemas.microsoft.com/office/drawing/2010/main">
                 <a:solidFill>
                   <a:srgbClr val="FFFFFF"/>
                 </a:solidFill>
               </a14:hiddenFill>
             </a:ext>
             <a:ext uri="{91240B29-F687-4f45-9708-019B960494DF}">
-              <a14:hiddenLine xmlns:a14="http://schemas.microsoft.com/office/drawing/2010/main" xmlns="" w="9525">
+              <a14:hiddenLine xmlns="" xmlns:a14="http://schemas.microsoft.com/office/drawing/2010/main" w="9525">
                 <a:solidFill>
                   <a:srgbClr val="000000"/>
                 </a:solidFill>
@@ -4456,14 +4457,14 @@
           </a:ln>
           <a:extLst>
             <a:ext uri="{909E8E84-426E-40dd-AFC4-6F175D3DCCD1}">
-              <a14:hiddenFill xmlns:a14="http://schemas.microsoft.com/office/drawing/2010/main" xmlns="">
+              <a14:hiddenFill xmlns="" xmlns:a14="http://schemas.microsoft.com/office/drawing/2010/main">
                 <a:solidFill>
                   <a:srgbClr val="FFFFFF"/>
                 </a:solidFill>
               </a14:hiddenFill>
             </a:ext>
             <a:ext uri="{91240B29-F687-4f45-9708-019B960494DF}">
-              <a14:hiddenLine xmlns:a14="http://schemas.microsoft.com/office/drawing/2010/main" xmlns="" w="9525">
+              <a14:hiddenLine xmlns="" xmlns:a14="http://schemas.microsoft.com/office/drawing/2010/main" w="9525">
                 <a:solidFill>
                   <a:srgbClr val="000000"/>
                 </a:solidFill>
@@ -4514,14 +4515,14 @@
           </a:ln>
           <a:extLst>
             <a:ext uri="{909E8E84-426E-40dd-AFC4-6F175D3DCCD1}">
-              <a14:hiddenFill xmlns:a14="http://schemas.microsoft.com/office/drawing/2010/main" xmlns="">
+              <a14:hiddenFill xmlns="" xmlns:a14="http://schemas.microsoft.com/office/drawing/2010/main">
                 <a:solidFill>
                   <a:srgbClr val="FFFFFF"/>
                 </a:solidFill>
               </a14:hiddenFill>
             </a:ext>
             <a:ext uri="{91240B29-F687-4f45-9708-019B960494DF}">
-              <a14:hiddenLine xmlns:a14="http://schemas.microsoft.com/office/drawing/2010/main" xmlns="" w="9525">
+              <a14:hiddenLine xmlns="" xmlns:a14="http://schemas.microsoft.com/office/drawing/2010/main" w="9525">
                 <a:solidFill>
                   <a:srgbClr val="000000"/>
                 </a:solidFill>
@@ -11852,7 +11853,7 @@
           <a:graphicData uri="http://schemas.openxmlformats.org/presentationml/2006/ole">
             <mc:AlternateContent xmlns:mc="http://schemas.openxmlformats.org/markup-compatibility/2006">
               <mc:Choice xmlns:v="urn:schemas-microsoft-com:vml" Requires="v">
-                <p:oleObj spid="_x0000_s9262" name="think-cell Folie" r:id="rId5" imgW="216" imgH="216" progId="TCLayout.ActiveDocument.1">
+                <p:oleObj spid="_x0000_s9267" name="think-cell Folie" r:id="rId5" imgW="216" imgH="216" progId="TCLayout.ActiveDocument.1">
                   <p:embed/>
                 </p:oleObj>
               </mc:Choice>
@@ -17106,6 +17107,2875 @@
           <a:chExt cx="0" cy="0"/>
         </a:xfrm>
       </p:grpSpPr>
+      <p:sp>
+        <p:nvSpPr>
+          <p:cNvPr id="3" name="Fußzeilenplatzhalter 2">
+            <a:extLst>
+              <a:ext uri="{FF2B5EF4-FFF2-40B4-BE49-F238E27FC236}">
+                <a16:creationId xmlns:a16="http://schemas.microsoft.com/office/drawing/2014/main" id="{0D819C9D-651B-47D5-A180-9EDD39B95DAB}"/>
+              </a:ext>
+            </a:extLst>
+          </p:cNvPr>
+          <p:cNvSpPr>
+            <a:spLocks noGrp="1"/>
+          </p:cNvSpPr>
+          <p:nvPr>
+            <p:ph type="ftr" sz="quarter" idx="10"/>
+          </p:nvPr>
+        </p:nvSpPr>
+        <p:spPr/>
+        <p:txBody>
+          <a:bodyPr/>
+          <a:lstStyle/>
+          <a:p>
+            <a:r>
+              <a:rPr lang="en-US" dirty="0"/>
+              <a:t>Title of presentation | Referee | Department | Location, Date</a:t>
+            </a:r>
+            <a:endParaRPr lang="de-DE" dirty="0"/>
+          </a:p>
+        </p:txBody>
+      </p:sp>
+      <p:sp>
+        <p:nvSpPr>
+          <p:cNvPr id="4" name="Titel 3">
+            <a:extLst>
+              <a:ext uri="{FF2B5EF4-FFF2-40B4-BE49-F238E27FC236}">
+                <a16:creationId xmlns:a16="http://schemas.microsoft.com/office/drawing/2014/main" id="{05E0347C-A27C-44ED-BAF8-045B79ECB39E}"/>
+              </a:ext>
+            </a:extLst>
+          </p:cNvPr>
+          <p:cNvSpPr>
+            <a:spLocks noGrp="1"/>
+          </p:cNvSpPr>
+          <p:nvPr>
+            <p:ph type="title"/>
+          </p:nvPr>
+        </p:nvSpPr>
+        <p:spPr/>
+        <p:txBody>
+          <a:bodyPr/>
+          <a:lstStyle/>
+          <a:p>
+            <a:endParaRPr lang="de-DE" dirty="0"/>
+          </a:p>
+        </p:txBody>
+      </p:sp>
+      <p:sp>
+        <p:nvSpPr>
+          <p:cNvPr id="5" name="Foliennummernplatzhalter 4">
+            <a:extLst>
+              <a:ext uri="{FF2B5EF4-FFF2-40B4-BE49-F238E27FC236}">
+                <a16:creationId xmlns:a16="http://schemas.microsoft.com/office/drawing/2014/main" id="{3720D536-38EF-4742-9F53-59BAB64714B6}"/>
+              </a:ext>
+            </a:extLst>
+          </p:cNvPr>
+          <p:cNvSpPr>
+            <a:spLocks noGrp="1"/>
+          </p:cNvSpPr>
+          <p:nvPr>
+            <p:ph type="sldNum" sz="quarter" idx="4"/>
+          </p:nvPr>
+        </p:nvSpPr>
+        <p:spPr/>
+        <p:txBody>
+          <a:bodyPr/>
+          <a:lstStyle/>
+          <a:p>
+            <a:pPr>
+              <a:defRPr/>
+            </a:pPr>
+            <a:fld id="{1A772D0B-F6CF-4E60-9E1F-EF6564956C0F}" type="slidenum">
+              <a:rPr lang="de-DE" sz="1000" smtClean="0">
+                <a:solidFill>
+                  <a:srgbClr val="0F2364"/>
+                </a:solidFill>
+              </a:rPr>
+              <a:pPr>
+                <a:defRPr/>
+              </a:pPr>
+              <a:t>4</a:t>
+            </a:fld>
+            <a:r>
+              <a:rPr lang="de-DE" sz="900" dirty="0">
+                <a:solidFill>
+                  <a:srgbClr val="0F2364"/>
+                </a:solidFill>
+              </a:rPr>
+              <a:t> </a:t>
+            </a:r>
+            <a:r>
+              <a:rPr lang="de-DE" sz="700" dirty="0">
+                <a:solidFill>
+                  <a:srgbClr val="0F2364"/>
+                </a:solidFill>
+              </a:rPr>
+              <a:t>Confidential ISO 16016</a:t>
+            </a:r>
+            <a:endParaRPr lang="de-DE" sz="900" dirty="0">
+              <a:solidFill>
+                <a:srgbClr val="0F2364"/>
+              </a:solidFill>
+            </a:endParaRPr>
+          </a:p>
+        </p:txBody>
+      </p:sp>
+      <p:sp>
+        <p:nvSpPr>
+          <p:cNvPr id="6" name="Rechteck 5">
+            <a:extLst>
+              <a:ext uri="{FF2B5EF4-FFF2-40B4-BE49-F238E27FC236}">
+                <a16:creationId xmlns:a16="http://schemas.microsoft.com/office/drawing/2014/main" id="{D88056EC-1BFD-4445-8116-705A7C18CB1A}"/>
+              </a:ext>
+            </a:extLst>
+          </p:cNvPr>
+          <p:cNvSpPr/>
+          <p:nvPr/>
+        </p:nvSpPr>
+        <p:spPr>
+          <a:xfrm>
+            <a:off x="1199456" y="2060847"/>
+            <a:ext cx="2232248" cy="435605"/>
+          </a:xfrm>
+          <a:prstGeom prst="rect">
+            <a:avLst/>
+          </a:prstGeom>
+          <a:noFill/>
+          <a:ln w="19050">
+            <a:solidFill>
+              <a:schemeClr val="bg2"/>
+            </a:solidFill>
+          </a:ln>
+        </p:spPr>
+        <p:style>
+          <a:lnRef idx="2">
+            <a:schemeClr val="accent1">
+              <a:shade val="50000"/>
+            </a:schemeClr>
+          </a:lnRef>
+          <a:fillRef idx="1">
+            <a:schemeClr val="accent1"/>
+          </a:fillRef>
+          <a:effectRef idx="0">
+            <a:schemeClr val="accent1"/>
+          </a:effectRef>
+          <a:fontRef idx="minor">
+            <a:schemeClr val="lt1"/>
+          </a:fontRef>
+        </p:style>
+        <p:txBody>
+          <a:bodyPr rtlCol="0" anchor="ctr"/>
+          <a:lstStyle/>
+          <a:p>
+            <a:pPr algn="ctr"/>
+            <a:endParaRPr lang="de-DE" dirty="0"/>
+          </a:p>
+        </p:txBody>
+      </p:sp>
+      <p:sp>
+        <p:nvSpPr>
+          <p:cNvPr id="7" name="Textfeld 6">
+            <a:extLst>
+              <a:ext uri="{FF2B5EF4-FFF2-40B4-BE49-F238E27FC236}">
+                <a16:creationId xmlns:a16="http://schemas.microsoft.com/office/drawing/2014/main" id="{77DE274E-BC72-4787-A081-9A509DC1650A}"/>
+              </a:ext>
+            </a:extLst>
+          </p:cNvPr>
+          <p:cNvSpPr txBox="1"/>
+          <p:nvPr/>
+        </p:nvSpPr>
+        <p:spPr>
+          <a:xfrm>
+            <a:off x="1199456" y="1772816"/>
+            <a:ext cx="2236190" cy="246221"/>
+          </a:xfrm>
+          <a:prstGeom prst="rect">
+            <a:avLst/>
+          </a:prstGeom>
+          <a:noFill/>
+        </p:spPr>
+        <p:txBody>
+          <a:bodyPr wrap="none" lIns="0" tIns="0" rIns="0" bIns="0" rtlCol="0">
+            <a:spAutoFit/>
+          </a:bodyPr>
+          <a:lstStyle/>
+          <a:p>
+            <a:r>
+              <a:rPr lang="de-DE" sz="1600" b="1" dirty="0">
+                <a:latin typeface="Arial" pitchFamily="34" charset="0"/>
+                <a:cs typeface="Arial" pitchFamily="34" charset="0"/>
+              </a:rPr>
+              <a:t>List&lt;</a:t>
+            </a:r>
+            <a:r>
+              <a:rPr lang="de-DE" sz="1600" dirty="0">
+                <a:latin typeface="Arial" pitchFamily="34" charset="0"/>
+                <a:cs typeface="Arial" pitchFamily="34" charset="0"/>
+              </a:rPr>
+              <a:t>List</a:t>
+            </a:r>
+            <a:r>
+              <a:rPr lang="de-DE" sz="1600" b="1" dirty="0">
+                <a:latin typeface="Arial" pitchFamily="34" charset="0"/>
+                <a:cs typeface="Arial" pitchFamily="34" charset="0"/>
+              </a:rPr>
+              <a:t>&gt; </a:t>
+            </a:r>
+            <a:r>
+              <a:rPr lang="de-DE" sz="1600" b="1" i="1" dirty="0">
+                <a:latin typeface="Arial" pitchFamily="34" charset="0"/>
+                <a:cs typeface="Arial" pitchFamily="34" charset="0"/>
+              </a:rPr>
+              <a:t>sentenceList</a:t>
+            </a:r>
+          </a:p>
+        </p:txBody>
+      </p:sp>
+      <p:sp>
+        <p:nvSpPr>
+          <p:cNvPr id="8" name="Rechteck 7">
+            <a:extLst>
+              <a:ext uri="{FF2B5EF4-FFF2-40B4-BE49-F238E27FC236}">
+                <a16:creationId xmlns:a16="http://schemas.microsoft.com/office/drawing/2014/main" id="{506F7B38-3FC1-4485-A276-026BE98F4EA8}"/>
+              </a:ext>
+            </a:extLst>
+          </p:cNvPr>
+          <p:cNvSpPr/>
+          <p:nvPr/>
+        </p:nvSpPr>
+        <p:spPr>
+          <a:xfrm>
+            <a:off x="1271464" y="2141488"/>
+            <a:ext cx="273682" cy="274321"/>
+          </a:xfrm>
+          <a:prstGeom prst="rect">
+            <a:avLst/>
+          </a:prstGeom>
+          <a:solidFill>
+            <a:schemeClr val="accent6"/>
+          </a:solidFill>
+          <a:ln w="9525">
+            <a:noFill/>
+          </a:ln>
+        </p:spPr>
+        <p:style>
+          <a:lnRef idx="2">
+            <a:schemeClr val="accent1">
+              <a:shade val="50000"/>
+            </a:schemeClr>
+          </a:lnRef>
+          <a:fillRef idx="1">
+            <a:schemeClr val="accent1"/>
+          </a:fillRef>
+          <a:effectRef idx="0">
+            <a:schemeClr val="accent1"/>
+          </a:effectRef>
+          <a:fontRef idx="minor">
+            <a:schemeClr val="lt1"/>
+          </a:fontRef>
+        </p:style>
+        <p:txBody>
+          <a:bodyPr rtlCol="0" anchor="ctr"/>
+          <a:lstStyle/>
+          <a:p>
+            <a:pPr algn="ctr"/>
+            <a:r>
+              <a:rPr lang="de-DE" dirty="0"/>
+              <a:t>1</a:t>
+            </a:r>
+          </a:p>
+        </p:txBody>
+      </p:sp>
+      <p:sp>
+        <p:nvSpPr>
+          <p:cNvPr id="9" name="Rechteck 8">
+            <a:extLst>
+              <a:ext uri="{FF2B5EF4-FFF2-40B4-BE49-F238E27FC236}">
+                <a16:creationId xmlns:a16="http://schemas.microsoft.com/office/drawing/2014/main" id="{6BACC47C-4E51-4182-8F0D-04EAF9A89EAE}"/>
+              </a:ext>
+            </a:extLst>
+          </p:cNvPr>
+          <p:cNvSpPr/>
+          <p:nvPr/>
+        </p:nvSpPr>
+        <p:spPr>
+          <a:xfrm>
+            <a:off x="1621276" y="2137783"/>
+            <a:ext cx="273682" cy="274321"/>
+          </a:xfrm>
+          <a:prstGeom prst="rect">
+            <a:avLst/>
+          </a:prstGeom>
+          <a:solidFill>
+            <a:schemeClr val="accent6"/>
+          </a:solidFill>
+          <a:ln w="9525">
+            <a:noFill/>
+          </a:ln>
+        </p:spPr>
+        <p:style>
+          <a:lnRef idx="2">
+            <a:schemeClr val="accent1">
+              <a:shade val="50000"/>
+            </a:schemeClr>
+          </a:lnRef>
+          <a:fillRef idx="1">
+            <a:schemeClr val="accent1"/>
+          </a:fillRef>
+          <a:effectRef idx="0">
+            <a:schemeClr val="accent1"/>
+          </a:effectRef>
+          <a:fontRef idx="minor">
+            <a:schemeClr val="lt1"/>
+          </a:fontRef>
+        </p:style>
+        <p:txBody>
+          <a:bodyPr rtlCol="0" anchor="ctr"/>
+          <a:lstStyle/>
+          <a:p>
+            <a:pPr algn="ctr"/>
+            <a:r>
+              <a:rPr lang="de-DE" dirty="0"/>
+              <a:t>2</a:t>
+            </a:r>
+          </a:p>
+        </p:txBody>
+      </p:sp>
+      <p:sp>
+        <p:nvSpPr>
+          <p:cNvPr id="10" name="Rechteck 9">
+            <a:extLst>
+              <a:ext uri="{FF2B5EF4-FFF2-40B4-BE49-F238E27FC236}">
+                <a16:creationId xmlns:a16="http://schemas.microsoft.com/office/drawing/2014/main" id="{896416A2-3B8E-4862-B891-F47A3B07193F}"/>
+              </a:ext>
+            </a:extLst>
+          </p:cNvPr>
+          <p:cNvSpPr/>
+          <p:nvPr/>
+        </p:nvSpPr>
+        <p:spPr>
+          <a:xfrm>
+            <a:off x="1966966" y="2137783"/>
+            <a:ext cx="273682" cy="274321"/>
+          </a:xfrm>
+          <a:prstGeom prst="rect">
+            <a:avLst/>
+          </a:prstGeom>
+          <a:solidFill>
+            <a:schemeClr val="accent6"/>
+          </a:solidFill>
+          <a:ln w="9525">
+            <a:noFill/>
+          </a:ln>
+        </p:spPr>
+        <p:style>
+          <a:lnRef idx="2">
+            <a:schemeClr val="accent1">
+              <a:shade val="50000"/>
+            </a:schemeClr>
+          </a:lnRef>
+          <a:fillRef idx="1">
+            <a:schemeClr val="accent1"/>
+          </a:fillRef>
+          <a:effectRef idx="0">
+            <a:schemeClr val="accent1"/>
+          </a:effectRef>
+          <a:fontRef idx="minor">
+            <a:schemeClr val="lt1"/>
+          </a:fontRef>
+        </p:style>
+        <p:txBody>
+          <a:bodyPr rtlCol="0" anchor="ctr"/>
+          <a:lstStyle/>
+          <a:p>
+            <a:pPr algn="ctr"/>
+            <a:r>
+              <a:rPr lang="de-DE" dirty="0"/>
+              <a:t>3</a:t>
+            </a:r>
+          </a:p>
+        </p:txBody>
+      </p:sp>
+      <p:sp>
+        <p:nvSpPr>
+          <p:cNvPr id="11" name="Textfeld 10">
+            <a:extLst>
+              <a:ext uri="{FF2B5EF4-FFF2-40B4-BE49-F238E27FC236}">
+                <a16:creationId xmlns:a16="http://schemas.microsoft.com/office/drawing/2014/main" id="{7D1A5219-D459-4933-9FC8-EE7AAE99F97E}"/>
+              </a:ext>
+            </a:extLst>
+          </p:cNvPr>
+          <p:cNvSpPr txBox="1"/>
+          <p:nvPr/>
+        </p:nvSpPr>
+        <p:spPr>
+          <a:xfrm>
+            <a:off x="2312656" y="2194776"/>
+            <a:ext cx="205184" cy="246221"/>
+          </a:xfrm>
+          <a:prstGeom prst="rect">
+            <a:avLst/>
+          </a:prstGeom>
+          <a:noFill/>
+        </p:spPr>
+        <p:txBody>
+          <a:bodyPr wrap="none" lIns="0" tIns="0" rIns="0" bIns="0" rtlCol="0">
+            <a:spAutoFit/>
+          </a:bodyPr>
+          <a:lstStyle/>
+          <a:p>
+            <a:r>
+              <a:rPr lang="de-DE" sz="1600" dirty="0">
+                <a:latin typeface="Arial" pitchFamily="34" charset="0"/>
+                <a:cs typeface="Arial" pitchFamily="34" charset="0"/>
+              </a:rPr>
+              <a:t>…</a:t>
+            </a:r>
+          </a:p>
+        </p:txBody>
+      </p:sp>
+      <p:sp>
+        <p:nvSpPr>
+          <p:cNvPr id="14" name="Pfeil: nach unten 13">
+            <a:extLst>
+              <a:ext uri="{FF2B5EF4-FFF2-40B4-BE49-F238E27FC236}">
+                <a16:creationId xmlns:a16="http://schemas.microsoft.com/office/drawing/2014/main" id="{0CFE3A30-3DA7-4F80-8079-DCD1D78DC6B4}"/>
+              </a:ext>
+            </a:extLst>
+          </p:cNvPr>
+          <p:cNvSpPr/>
+          <p:nvPr/>
+        </p:nvSpPr>
+        <p:spPr>
+          <a:xfrm>
+            <a:off x="1295364" y="2397233"/>
+            <a:ext cx="237024" cy="359719"/>
+          </a:xfrm>
+          <a:prstGeom prst="downArrow">
+            <a:avLst/>
+          </a:prstGeom>
+          <a:solidFill>
+            <a:schemeClr val="accent6"/>
+          </a:solidFill>
+          <a:ln w="9525">
+            <a:noFill/>
+          </a:ln>
+        </p:spPr>
+        <p:style>
+          <a:lnRef idx="2">
+            <a:schemeClr val="accent1">
+              <a:shade val="50000"/>
+            </a:schemeClr>
+          </a:lnRef>
+          <a:fillRef idx="1">
+            <a:schemeClr val="accent1"/>
+          </a:fillRef>
+          <a:effectRef idx="0">
+            <a:schemeClr val="accent1"/>
+          </a:effectRef>
+          <a:fontRef idx="minor">
+            <a:schemeClr val="lt1"/>
+          </a:fontRef>
+        </p:style>
+        <p:txBody>
+          <a:bodyPr rtlCol="0" anchor="ctr"/>
+          <a:lstStyle/>
+          <a:p>
+            <a:pPr algn="ctr"/>
+            <a:endParaRPr lang="de-DE" dirty="0"/>
+          </a:p>
+        </p:txBody>
+      </p:sp>
+      <p:sp>
+        <p:nvSpPr>
+          <p:cNvPr id="15" name="Rechteck 14">
+            <a:extLst>
+              <a:ext uri="{FF2B5EF4-FFF2-40B4-BE49-F238E27FC236}">
+                <a16:creationId xmlns:a16="http://schemas.microsoft.com/office/drawing/2014/main" id="{A192FEC4-80E1-4BA3-AE86-1154AAFC4025}"/>
+              </a:ext>
+            </a:extLst>
+          </p:cNvPr>
+          <p:cNvSpPr/>
+          <p:nvPr/>
+        </p:nvSpPr>
+        <p:spPr>
+          <a:xfrm rot="16200000">
+            <a:off x="820942" y="3196094"/>
+            <a:ext cx="1184574" cy="289350"/>
+          </a:xfrm>
+          <a:prstGeom prst="rect">
+            <a:avLst/>
+          </a:prstGeom>
+          <a:noFill/>
+          <a:ln w="19050">
+            <a:solidFill>
+              <a:schemeClr val="bg2"/>
+            </a:solidFill>
+          </a:ln>
+        </p:spPr>
+        <p:style>
+          <a:lnRef idx="2">
+            <a:schemeClr val="accent1">
+              <a:shade val="50000"/>
+            </a:schemeClr>
+          </a:lnRef>
+          <a:fillRef idx="1">
+            <a:schemeClr val="accent1"/>
+          </a:fillRef>
+          <a:effectRef idx="0">
+            <a:schemeClr val="accent1"/>
+          </a:effectRef>
+          <a:fontRef idx="minor">
+            <a:schemeClr val="lt1"/>
+          </a:fontRef>
+        </p:style>
+        <p:txBody>
+          <a:bodyPr rtlCol="0" anchor="ctr"/>
+          <a:lstStyle/>
+          <a:p>
+            <a:r>
+              <a:rPr lang="de-DE" dirty="0">
+                <a:solidFill>
+                  <a:schemeClr val="tx1"/>
+                </a:solidFill>
+              </a:rPr>
+              <a:t>...</a:t>
+            </a:r>
+          </a:p>
+        </p:txBody>
+      </p:sp>
+      <p:sp>
+        <p:nvSpPr>
+          <p:cNvPr id="16" name="Rechteck 15">
+            <a:extLst>
+              <a:ext uri="{FF2B5EF4-FFF2-40B4-BE49-F238E27FC236}">
+                <a16:creationId xmlns:a16="http://schemas.microsoft.com/office/drawing/2014/main" id="{A9841746-28FB-4B02-895C-F4CF12CD5B45}"/>
+              </a:ext>
+            </a:extLst>
+          </p:cNvPr>
+          <p:cNvSpPr/>
+          <p:nvPr/>
+        </p:nvSpPr>
+        <p:spPr>
+          <a:xfrm>
+            <a:off x="1308923" y="2799506"/>
+            <a:ext cx="198764" cy="174099"/>
+          </a:xfrm>
+          <a:prstGeom prst="rect">
+            <a:avLst/>
+          </a:prstGeom>
+          <a:solidFill>
+            <a:schemeClr val="accent6"/>
+          </a:solidFill>
+          <a:ln w="9525">
+            <a:noFill/>
+          </a:ln>
+        </p:spPr>
+        <p:style>
+          <a:lnRef idx="2">
+            <a:schemeClr val="accent1">
+              <a:shade val="50000"/>
+            </a:schemeClr>
+          </a:lnRef>
+          <a:fillRef idx="1">
+            <a:schemeClr val="accent1"/>
+          </a:fillRef>
+          <a:effectRef idx="0">
+            <a:schemeClr val="accent1"/>
+          </a:effectRef>
+          <a:fontRef idx="minor">
+            <a:schemeClr val="lt1"/>
+          </a:fontRef>
+        </p:style>
+        <p:txBody>
+          <a:bodyPr rtlCol="0" anchor="ctr"/>
+          <a:lstStyle/>
+          <a:p>
+            <a:pPr algn="ctr"/>
+            <a:endParaRPr lang="de-DE" dirty="0"/>
+          </a:p>
+        </p:txBody>
+      </p:sp>
+      <p:sp>
+        <p:nvSpPr>
+          <p:cNvPr id="19" name="Rechteck 18">
+            <a:extLst>
+              <a:ext uri="{FF2B5EF4-FFF2-40B4-BE49-F238E27FC236}">
+                <a16:creationId xmlns:a16="http://schemas.microsoft.com/office/drawing/2014/main" id="{4F224BAE-E432-4491-B787-678E2C4638FB}"/>
+              </a:ext>
+            </a:extLst>
+          </p:cNvPr>
+          <p:cNvSpPr/>
+          <p:nvPr/>
+        </p:nvSpPr>
+        <p:spPr>
+          <a:xfrm>
+            <a:off x="1308923" y="3084624"/>
+            <a:ext cx="198764" cy="174099"/>
+          </a:xfrm>
+          <a:prstGeom prst="rect">
+            <a:avLst/>
+          </a:prstGeom>
+          <a:solidFill>
+            <a:schemeClr val="accent6"/>
+          </a:solidFill>
+          <a:ln w="9525">
+            <a:noFill/>
+          </a:ln>
+        </p:spPr>
+        <p:style>
+          <a:lnRef idx="2">
+            <a:schemeClr val="accent1">
+              <a:shade val="50000"/>
+            </a:schemeClr>
+          </a:lnRef>
+          <a:fillRef idx="1">
+            <a:schemeClr val="accent1"/>
+          </a:fillRef>
+          <a:effectRef idx="0">
+            <a:schemeClr val="accent1"/>
+          </a:effectRef>
+          <a:fontRef idx="minor">
+            <a:schemeClr val="lt1"/>
+          </a:fontRef>
+        </p:style>
+        <p:txBody>
+          <a:bodyPr rtlCol="0" anchor="ctr"/>
+          <a:lstStyle/>
+          <a:p>
+            <a:pPr algn="ctr"/>
+            <a:endParaRPr lang="de-DE" dirty="0"/>
+          </a:p>
+        </p:txBody>
+      </p:sp>
+      <p:sp>
+        <p:nvSpPr>
+          <p:cNvPr id="20" name="Pfeil: nach unten 19">
+            <a:extLst>
+              <a:ext uri="{FF2B5EF4-FFF2-40B4-BE49-F238E27FC236}">
+                <a16:creationId xmlns:a16="http://schemas.microsoft.com/office/drawing/2014/main" id="{7A4EE428-D06D-4B34-B4C9-F7B93E1D263B}"/>
+              </a:ext>
+            </a:extLst>
+          </p:cNvPr>
+          <p:cNvSpPr/>
+          <p:nvPr/>
+        </p:nvSpPr>
+        <p:spPr>
+          <a:xfrm>
+            <a:off x="1643923" y="2397272"/>
+            <a:ext cx="237024" cy="359719"/>
+          </a:xfrm>
+          <a:prstGeom prst="downArrow">
+            <a:avLst/>
+          </a:prstGeom>
+          <a:solidFill>
+            <a:schemeClr val="accent6"/>
+          </a:solidFill>
+          <a:ln w="9525">
+            <a:noFill/>
+          </a:ln>
+        </p:spPr>
+        <p:style>
+          <a:lnRef idx="2">
+            <a:schemeClr val="accent1">
+              <a:shade val="50000"/>
+            </a:schemeClr>
+          </a:lnRef>
+          <a:fillRef idx="1">
+            <a:schemeClr val="accent1"/>
+          </a:fillRef>
+          <a:effectRef idx="0">
+            <a:schemeClr val="accent1"/>
+          </a:effectRef>
+          <a:fontRef idx="minor">
+            <a:schemeClr val="lt1"/>
+          </a:fontRef>
+        </p:style>
+        <p:txBody>
+          <a:bodyPr rtlCol="0" anchor="ctr"/>
+          <a:lstStyle/>
+          <a:p>
+            <a:pPr algn="ctr"/>
+            <a:endParaRPr lang="de-DE" dirty="0"/>
+          </a:p>
+        </p:txBody>
+      </p:sp>
+      <p:sp>
+        <p:nvSpPr>
+          <p:cNvPr id="21" name="Textfeld 20">
+            <a:extLst>
+              <a:ext uri="{FF2B5EF4-FFF2-40B4-BE49-F238E27FC236}">
+                <a16:creationId xmlns:a16="http://schemas.microsoft.com/office/drawing/2014/main" id="{10253248-50A6-472E-8D73-FE7AF14C05F7}"/>
+              </a:ext>
+            </a:extLst>
+          </p:cNvPr>
+          <p:cNvSpPr txBox="1"/>
+          <p:nvPr/>
+        </p:nvSpPr>
+        <p:spPr>
+          <a:xfrm rot="16200000">
+            <a:off x="330179" y="3305889"/>
+            <a:ext cx="1585370" cy="246221"/>
+          </a:xfrm>
+          <a:prstGeom prst="rect">
+            <a:avLst/>
+          </a:prstGeom>
+          <a:noFill/>
+        </p:spPr>
+        <p:txBody>
+          <a:bodyPr wrap="none" lIns="0" tIns="0" rIns="0" bIns="0" rtlCol="0">
+            <a:spAutoFit/>
+          </a:bodyPr>
+          <a:lstStyle/>
+          <a:p>
+            <a:r>
+              <a:rPr lang="de-DE" sz="1600" b="1" dirty="0">
+                <a:latin typeface="Arial" pitchFamily="34" charset="0"/>
+                <a:cs typeface="Arial" pitchFamily="34" charset="0"/>
+              </a:rPr>
+              <a:t>List&lt;</a:t>
+            </a:r>
+            <a:r>
+              <a:rPr lang="de-DE" sz="1600" dirty="0">
+                <a:latin typeface="Arial" pitchFamily="34" charset="0"/>
+                <a:cs typeface="Arial" pitchFamily="34" charset="0"/>
+              </a:rPr>
+              <a:t>Annotation</a:t>
+            </a:r>
+            <a:r>
+              <a:rPr lang="de-DE" sz="1600" b="1" dirty="0">
+                <a:latin typeface="Arial" pitchFamily="34" charset="0"/>
+                <a:cs typeface="Arial" pitchFamily="34" charset="0"/>
+              </a:rPr>
+              <a:t>&gt;</a:t>
+            </a:r>
+          </a:p>
+        </p:txBody>
+      </p:sp>
+      <p:cxnSp>
+        <p:nvCxnSpPr>
+          <p:cNvPr id="23" name="Gerade Verbindung mit Pfeil 22">
+            <a:extLst>
+              <a:ext uri="{FF2B5EF4-FFF2-40B4-BE49-F238E27FC236}">
+                <a16:creationId xmlns:a16="http://schemas.microsoft.com/office/drawing/2014/main" id="{828D95FD-97B8-46DA-A99F-974317D9D79A}"/>
+              </a:ext>
+            </a:extLst>
+          </p:cNvPr>
+          <p:cNvCxnSpPr>
+            <a:cxnSpLocks/>
+            <a:stCxn id="30" idx="3"/>
+            <a:endCxn id="6" idx="1"/>
+          </p:cNvCxnSpPr>
+          <p:nvPr/>
+        </p:nvCxnSpPr>
+        <p:spPr>
+          <a:xfrm>
+            <a:off x="982966" y="2274943"/>
+            <a:ext cx="216490" cy="3707"/>
+          </a:xfrm>
+          <a:prstGeom prst="straightConnector1">
+            <a:avLst/>
+          </a:prstGeom>
+          <a:ln>
+            <a:solidFill>
+              <a:schemeClr val="tx1"/>
+            </a:solidFill>
+            <a:tailEnd type="triangle"/>
+          </a:ln>
+        </p:spPr>
+        <p:style>
+          <a:lnRef idx="1">
+            <a:schemeClr val="accent1"/>
+          </a:lnRef>
+          <a:fillRef idx="0">
+            <a:schemeClr val="accent1"/>
+          </a:fillRef>
+          <a:effectRef idx="0">
+            <a:schemeClr val="accent1"/>
+          </a:effectRef>
+          <a:fontRef idx="minor">
+            <a:schemeClr val="tx1"/>
+          </a:fontRef>
+        </p:style>
+      </p:cxnSp>
+      <p:sp>
+        <p:nvSpPr>
+          <p:cNvPr id="30" name="Textfeld 29">
+            <a:extLst>
+              <a:ext uri="{FF2B5EF4-FFF2-40B4-BE49-F238E27FC236}">
+                <a16:creationId xmlns:a16="http://schemas.microsoft.com/office/drawing/2014/main" id="{9C8D67E8-59DC-4F04-9A53-EA1AD4A65BCC}"/>
+              </a:ext>
+            </a:extLst>
+          </p:cNvPr>
+          <p:cNvSpPr txBox="1"/>
+          <p:nvPr/>
+        </p:nvSpPr>
+        <p:spPr>
+          <a:xfrm>
+            <a:off x="524507" y="2167221"/>
+            <a:ext cx="458459" cy="215444"/>
+          </a:xfrm>
+          <a:prstGeom prst="rect">
+            <a:avLst/>
+          </a:prstGeom>
+          <a:noFill/>
+        </p:spPr>
+        <p:txBody>
+          <a:bodyPr wrap="none" lIns="0" tIns="0" rIns="0" bIns="0" rtlCol="0">
+            <a:spAutoFit/>
+          </a:bodyPr>
+          <a:lstStyle/>
+          <a:p>
+            <a:r>
+              <a:rPr lang="de-DE" sz="1400" i="1" dirty="0">
+                <a:latin typeface="Arial" pitchFamily="34" charset="0"/>
+                <a:cs typeface="Arial" pitchFamily="34" charset="0"/>
+              </a:rPr>
+              <a:t>Sätze</a:t>
+            </a:r>
+          </a:p>
+        </p:txBody>
+      </p:sp>
+      <p:sp>
+        <p:nvSpPr>
+          <p:cNvPr id="35" name="Textfeld 34">
+            <a:extLst>
+              <a:ext uri="{FF2B5EF4-FFF2-40B4-BE49-F238E27FC236}">
+                <a16:creationId xmlns:a16="http://schemas.microsoft.com/office/drawing/2014/main" id="{0E57B3D9-1F21-4CCB-BF9A-A3B51E9F3754}"/>
+              </a:ext>
+            </a:extLst>
+          </p:cNvPr>
+          <p:cNvSpPr txBox="1"/>
+          <p:nvPr/>
+        </p:nvSpPr>
+        <p:spPr>
+          <a:xfrm>
+            <a:off x="1834769" y="3062081"/>
+            <a:ext cx="1671933" cy="215444"/>
+          </a:xfrm>
+          <a:prstGeom prst="rect">
+            <a:avLst/>
+          </a:prstGeom>
+          <a:noFill/>
+          <a:ln>
+            <a:solidFill>
+              <a:schemeClr val="bg2"/>
+            </a:solidFill>
+          </a:ln>
+        </p:spPr>
+        <p:txBody>
+          <a:bodyPr wrap="none" lIns="0" tIns="0" rIns="0" bIns="0" rtlCol="0">
+            <a:spAutoFit/>
+          </a:bodyPr>
+          <a:lstStyle/>
+          <a:p>
+            <a:r>
+              <a:rPr lang="de-DE" sz="1400" i="1" dirty="0">
+                <a:latin typeface="Arial" pitchFamily="34" charset="0"/>
+                <a:cs typeface="Arial" pitchFamily="34" charset="0"/>
+              </a:rPr>
+              <a:t>Sentence-Annotation</a:t>
+            </a:r>
+          </a:p>
+        </p:txBody>
+      </p:sp>
+      <p:cxnSp>
+        <p:nvCxnSpPr>
+          <p:cNvPr id="36" name="Gerade Verbindung mit Pfeil 35">
+            <a:extLst>
+              <a:ext uri="{FF2B5EF4-FFF2-40B4-BE49-F238E27FC236}">
+                <a16:creationId xmlns:a16="http://schemas.microsoft.com/office/drawing/2014/main" id="{A8C0B40A-25BD-4BEA-B0A2-D55AE91D7471}"/>
+              </a:ext>
+            </a:extLst>
+          </p:cNvPr>
+          <p:cNvCxnSpPr>
+            <a:cxnSpLocks/>
+            <a:stCxn id="35" idx="1"/>
+            <a:endCxn id="16" idx="3"/>
+          </p:cNvCxnSpPr>
+          <p:nvPr/>
+        </p:nvCxnSpPr>
+        <p:spPr>
+          <a:xfrm flipH="1" flipV="1">
+            <a:off x="1507687" y="2886556"/>
+            <a:ext cx="327082" cy="283247"/>
+          </a:xfrm>
+          <a:prstGeom prst="straightConnector1">
+            <a:avLst/>
+          </a:prstGeom>
+          <a:ln>
+            <a:solidFill>
+              <a:schemeClr val="tx1"/>
+            </a:solidFill>
+            <a:tailEnd type="triangle"/>
+          </a:ln>
+        </p:spPr>
+        <p:style>
+          <a:lnRef idx="1">
+            <a:schemeClr val="accent1"/>
+          </a:lnRef>
+          <a:fillRef idx="0">
+            <a:schemeClr val="accent1"/>
+          </a:fillRef>
+          <a:effectRef idx="0">
+            <a:schemeClr val="accent1"/>
+          </a:effectRef>
+          <a:fontRef idx="minor">
+            <a:schemeClr val="tx1"/>
+          </a:fontRef>
+        </p:style>
+      </p:cxnSp>
+      <p:sp>
+        <p:nvSpPr>
+          <p:cNvPr id="41" name="Textfeld 40">
+            <a:extLst>
+              <a:ext uri="{FF2B5EF4-FFF2-40B4-BE49-F238E27FC236}">
+                <a16:creationId xmlns:a16="http://schemas.microsoft.com/office/drawing/2014/main" id="{D525CED8-A0BB-416C-8A27-77D4B5101374}"/>
+              </a:ext>
+            </a:extLst>
+          </p:cNvPr>
+          <p:cNvSpPr txBox="1"/>
+          <p:nvPr/>
+        </p:nvSpPr>
+        <p:spPr>
+          <a:xfrm>
+            <a:off x="1839362" y="3343036"/>
+            <a:ext cx="1721231" cy="215444"/>
+          </a:xfrm>
+          <a:prstGeom prst="rect">
+            <a:avLst/>
+          </a:prstGeom>
+          <a:noFill/>
+          <a:ln>
+            <a:solidFill>
+              <a:schemeClr val="bg2"/>
+            </a:solidFill>
+          </a:ln>
+        </p:spPr>
+        <p:txBody>
+          <a:bodyPr wrap="square" lIns="0" tIns="0" rIns="0" bIns="0" rtlCol="0">
+            <a:spAutoFit/>
+          </a:bodyPr>
+          <a:lstStyle/>
+          <a:p>
+            <a:r>
+              <a:rPr lang="de-DE" sz="1400" i="1" dirty="0">
+                <a:latin typeface="Arial" pitchFamily="34" charset="0"/>
+                <a:cs typeface="Arial" pitchFamily="34" charset="0"/>
+              </a:rPr>
+              <a:t>BP-Annotation 1-n</a:t>
+            </a:r>
+          </a:p>
+        </p:txBody>
+      </p:sp>
+      <p:cxnSp>
+        <p:nvCxnSpPr>
+          <p:cNvPr id="42" name="Gerade Verbindung mit Pfeil 41">
+            <a:extLst>
+              <a:ext uri="{FF2B5EF4-FFF2-40B4-BE49-F238E27FC236}">
+                <a16:creationId xmlns:a16="http://schemas.microsoft.com/office/drawing/2014/main" id="{C1318779-FC2F-43BE-B966-F39A0915519D}"/>
+              </a:ext>
+            </a:extLst>
+          </p:cNvPr>
+          <p:cNvCxnSpPr>
+            <a:cxnSpLocks/>
+            <a:stCxn id="41" idx="1"/>
+            <a:endCxn id="19" idx="3"/>
+          </p:cNvCxnSpPr>
+          <p:nvPr/>
+        </p:nvCxnSpPr>
+        <p:spPr>
+          <a:xfrm flipH="1" flipV="1">
+            <a:off x="1507687" y="3171674"/>
+            <a:ext cx="331675" cy="279084"/>
+          </a:xfrm>
+          <a:prstGeom prst="straightConnector1">
+            <a:avLst/>
+          </a:prstGeom>
+          <a:ln>
+            <a:solidFill>
+              <a:schemeClr val="tx1"/>
+            </a:solidFill>
+            <a:tailEnd type="triangle"/>
+          </a:ln>
+        </p:spPr>
+        <p:style>
+          <a:lnRef idx="1">
+            <a:schemeClr val="accent1"/>
+          </a:lnRef>
+          <a:fillRef idx="0">
+            <a:schemeClr val="accent1"/>
+          </a:fillRef>
+          <a:effectRef idx="0">
+            <a:schemeClr val="accent1"/>
+          </a:effectRef>
+          <a:fontRef idx="minor">
+            <a:schemeClr val="tx1"/>
+          </a:fontRef>
+        </p:style>
+      </p:cxnSp>
+      <p:sp>
+        <p:nvSpPr>
+          <p:cNvPr id="52" name="Textfeld 51">
+            <a:extLst>
+              <a:ext uri="{FF2B5EF4-FFF2-40B4-BE49-F238E27FC236}">
+                <a16:creationId xmlns:a16="http://schemas.microsoft.com/office/drawing/2014/main" id="{B04ECD02-8070-4CAB-B86D-4520058217C3}"/>
+              </a:ext>
+            </a:extLst>
+          </p:cNvPr>
+          <p:cNvSpPr txBox="1"/>
+          <p:nvPr/>
+        </p:nvSpPr>
+        <p:spPr>
+          <a:xfrm rot="16200000">
+            <a:off x="1652076" y="2735477"/>
+            <a:ext cx="205184" cy="246221"/>
+          </a:xfrm>
+          <a:prstGeom prst="rect">
+            <a:avLst/>
+          </a:prstGeom>
+          <a:noFill/>
+        </p:spPr>
+        <p:txBody>
+          <a:bodyPr wrap="none" lIns="0" tIns="0" rIns="0" bIns="0" rtlCol="0">
+            <a:spAutoFit/>
+          </a:bodyPr>
+          <a:lstStyle/>
+          <a:p>
+            <a:r>
+              <a:rPr lang="de-DE" sz="1600" b="1" dirty="0">
+                <a:latin typeface="Arial" pitchFamily="34" charset="0"/>
+                <a:cs typeface="Arial" pitchFamily="34" charset="0"/>
+              </a:rPr>
+              <a:t>…</a:t>
+            </a:r>
+          </a:p>
+        </p:txBody>
+      </p:sp>
+      <p:sp>
+        <p:nvSpPr>
+          <p:cNvPr id="55" name="Rechteck 54">
+            <a:extLst>
+              <a:ext uri="{FF2B5EF4-FFF2-40B4-BE49-F238E27FC236}">
+                <a16:creationId xmlns:a16="http://schemas.microsoft.com/office/drawing/2014/main" id="{60A686DB-2279-41B3-BE73-5493AAEE6A1E}"/>
+              </a:ext>
+            </a:extLst>
+          </p:cNvPr>
+          <p:cNvSpPr/>
+          <p:nvPr/>
+        </p:nvSpPr>
+        <p:spPr>
+          <a:xfrm>
+            <a:off x="1310918" y="3363709"/>
+            <a:ext cx="198764" cy="174099"/>
+          </a:xfrm>
+          <a:prstGeom prst="rect">
+            <a:avLst/>
+          </a:prstGeom>
+          <a:solidFill>
+            <a:schemeClr val="accent6"/>
+          </a:solidFill>
+          <a:ln w="9525">
+            <a:noFill/>
+          </a:ln>
+        </p:spPr>
+        <p:style>
+          <a:lnRef idx="2">
+            <a:schemeClr val="accent1">
+              <a:shade val="50000"/>
+            </a:schemeClr>
+          </a:lnRef>
+          <a:fillRef idx="1">
+            <a:schemeClr val="accent1"/>
+          </a:fillRef>
+          <a:effectRef idx="0">
+            <a:schemeClr val="accent1"/>
+          </a:effectRef>
+          <a:fontRef idx="minor">
+            <a:schemeClr val="lt1"/>
+          </a:fontRef>
+        </p:style>
+        <p:txBody>
+          <a:bodyPr rtlCol="0" anchor="ctr"/>
+          <a:lstStyle/>
+          <a:p>
+            <a:pPr algn="ctr"/>
+            <a:endParaRPr lang="de-DE" dirty="0"/>
+          </a:p>
+        </p:txBody>
+      </p:sp>
+      <p:cxnSp>
+        <p:nvCxnSpPr>
+          <p:cNvPr id="56" name="Gerade Verbindung mit Pfeil 55">
+            <a:extLst>
+              <a:ext uri="{FF2B5EF4-FFF2-40B4-BE49-F238E27FC236}">
+                <a16:creationId xmlns:a16="http://schemas.microsoft.com/office/drawing/2014/main" id="{482B4E2C-91B9-4638-BE96-D5F7B29E5851}"/>
+              </a:ext>
+            </a:extLst>
+          </p:cNvPr>
+          <p:cNvCxnSpPr>
+            <a:cxnSpLocks/>
+            <a:stCxn id="41" idx="1"/>
+            <a:endCxn id="55" idx="3"/>
+          </p:cNvCxnSpPr>
+          <p:nvPr/>
+        </p:nvCxnSpPr>
+        <p:spPr>
+          <a:xfrm flipH="1">
+            <a:off x="1509682" y="3450758"/>
+            <a:ext cx="329680" cy="1"/>
+          </a:xfrm>
+          <a:prstGeom prst="straightConnector1">
+            <a:avLst/>
+          </a:prstGeom>
+          <a:ln>
+            <a:solidFill>
+              <a:schemeClr val="tx1"/>
+            </a:solidFill>
+            <a:tailEnd type="triangle"/>
+          </a:ln>
+        </p:spPr>
+        <p:style>
+          <a:lnRef idx="1">
+            <a:schemeClr val="accent1"/>
+          </a:lnRef>
+          <a:fillRef idx="0">
+            <a:schemeClr val="accent1"/>
+          </a:fillRef>
+          <a:effectRef idx="0">
+            <a:schemeClr val="accent1"/>
+          </a:effectRef>
+          <a:fontRef idx="minor">
+            <a:schemeClr val="tx1"/>
+          </a:fontRef>
+        </p:style>
+      </p:cxnSp>
+      <p:sp>
+        <p:nvSpPr>
+          <p:cNvPr id="61" name="Pfeil: nach unten 60">
+            <a:extLst>
+              <a:ext uri="{FF2B5EF4-FFF2-40B4-BE49-F238E27FC236}">
+                <a16:creationId xmlns:a16="http://schemas.microsoft.com/office/drawing/2014/main" id="{E8EDFA31-817B-4C56-A487-20A4088BC554}"/>
+              </a:ext>
+            </a:extLst>
+          </p:cNvPr>
+          <p:cNvSpPr/>
+          <p:nvPr/>
+        </p:nvSpPr>
+        <p:spPr>
+          <a:xfrm>
+            <a:off x="1992482" y="2398677"/>
+            <a:ext cx="237024" cy="359719"/>
+          </a:xfrm>
+          <a:prstGeom prst="downArrow">
+            <a:avLst/>
+          </a:prstGeom>
+          <a:solidFill>
+            <a:schemeClr val="accent6"/>
+          </a:solidFill>
+          <a:ln w="9525">
+            <a:noFill/>
+          </a:ln>
+        </p:spPr>
+        <p:style>
+          <a:lnRef idx="2">
+            <a:schemeClr val="accent1">
+              <a:shade val="50000"/>
+            </a:schemeClr>
+          </a:lnRef>
+          <a:fillRef idx="1">
+            <a:schemeClr val="accent1"/>
+          </a:fillRef>
+          <a:effectRef idx="0">
+            <a:schemeClr val="accent1"/>
+          </a:effectRef>
+          <a:fontRef idx="minor">
+            <a:schemeClr val="lt1"/>
+          </a:fontRef>
+        </p:style>
+        <p:txBody>
+          <a:bodyPr rtlCol="0" anchor="ctr"/>
+          <a:lstStyle/>
+          <a:p>
+            <a:pPr algn="ctr"/>
+            <a:endParaRPr lang="de-DE" dirty="0"/>
+          </a:p>
+        </p:txBody>
+      </p:sp>
+      <p:sp>
+        <p:nvSpPr>
+          <p:cNvPr id="62" name="Textfeld 61">
+            <a:extLst>
+              <a:ext uri="{FF2B5EF4-FFF2-40B4-BE49-F238E27FC236}">
+                <a16:creationId xmlns:a16="http://schemas.microsoft.com/office/drawing/2014/main" id="{55F05A2E-0A47-4C4F-873F-61D7BF7AE9E7}"/>
+              </a:ext>
+            </a:extLst>
+          </p:cNvPr>
+          <p:cNvSpPr txBox="1"/>
+          <p:nvPr/>
+        </p:nvSpPr>
+        <p:spPr>
+          <a:xfrm rot="16200000">
+            <a:off x="2000635" y="2736882"/>
+            <a:ext cx="205184" cy="246221"/>
+          </a:xfrm>
+          <a:prstGeom prst="rect">
+            <a:avLst/>
+          </a:prstGeom>
+          <a:noFill/>
+        </p:spPr>
+        <p:txBody>
+          <a:bodyPr wrap="none" lIns="0" tIns="0" rIns="0" bIns="0" rtlCol="0">
+            <a:spAutoFit/>
+          </a:bodyPr>
+          <a:lstStyle/>
+          <a:p>
+            <a:r>
+              <a:rPr lang="de-DE" sz="1600" b="1" dirty="0">
+                <a:latin typeface="Arial" pitchFamily="34" charset="0"/>
+                <a:cs typeface="Arial" pitchFamily="34" charset="0"/>
+              </a:rPr>
+              <a:t>…</a:t>
+            </a:r>
+          </a:p>
+        </p:txBody>
+      </p:sp>
+      <p:sp>
+        <p:nvSpPr>
+          <p:cNvPr id="63" name="Pfeil: nach rechts 62">
+            <a:extLst>
+              <a:ext uri="{FF2B5EF4-FFF2-40B4-BE49-F238E27FC236}">
+                <a16:creationId xmlns:a16="http://schemas.microsoft.com/office/drawing/2014/main" id="{F2B5A10F-5C6E-4812-A48B-B645B3AA9B55}"/>
+              </a:ext>
+            </a:extLst>
+          </p:cNvPr>
+          <p:cNvSpPr/>
+          <p:nvPr/>
+        </p:nvSpPr>
+        <p:spPr>
+          <a:xfrm>
+            <a:off x="3663119" y="2577092"/>
+            <a:ext cx="1342859" cy="829551"/>
+          </a:xfrm>
+          <a:prstGeom prst="rightArrow">
+            <a:avLst/>
+          </a:prstGeom>
+          <a:solidFill>
+            <a:schemeClr val="accent6"/>
+          </a:solidFill>
+          <a:ln w="9525">
+            <a:noFill/>
+          </a:ln>
+        </p:spPr>
+        <p:style>
+          <a:lnRef idx="2">
+            <a:schemeClr val="accent1">
+              <a:shade val="50000"/>
+            </a:schemeClr>
+          </a:lnRef>
+          <a:fillRef idx="1">
+            <a:schemeClr val="accent1"/>
+          </a:fillRef>
+          <a:effectRef idx="0">
+            <a:schemeClr val="accent1"/>
+          </a:effectRef>
+          <a:fontRef idx="minor">
+            <a:schemeClr val="lt1"/>
+          </a:fontRef>
+        </p:style>
+        <p:txBody>
+          <a:bodyPr rtlCol="0" anchor="ctr"/>
+          <a:lstStyle/>
+          <a:p>
+            <a:pPr algn="ctr"/>
+            <a:r>
+              <a:rPr lang="de-DE" sz="1200" dirty="0">
+                <a:solidFill>
+                  <a:schemeClr val="tx1"/>
+                </a:solidFill>
+              </a:rPr>
+              <a:t>Konvertierung</a:t>
+            </a:r>
+          </a:p>
+        </p:txBody>
+      </p:sp>
+      <p:sp>
+        <p:nvSpPr>
+          <p:cNvPr id="64" name="Rechteck 63">
+            <a:extLst>
+              <a:ext uri="{FF2B5EF4-FFF2-40B4-BE49-F238E27FC236}">
+                <a16:creationId xmlns:a16="http://schemas.microsoft.com/office/drawing/2014/main" id="{9AB692B8-1C5A-41B4-8B3E-DC55CA00AC72}"/>
+              </a:ext>
+            </a:extLst>
+          </p:cNvPr>
+          <p:cNvSpPr/>
+          <p:nvPr/>
+        </p:nvSpPr>
+        <p:spPr>
+          <a:xfrm>
+            <a:off x="5465103" y="2060847"/>
+            <a:ext cx="2232248" cy="435605"/>
+          </a:xfrm>
+          <a:prstGeom prst="rect">
+            <a:avLst/>
+          </a:prstGeom>
+          <a:noFill/>
+          <a:ln w="19050">
+            <a:solidFill>
+              <a:schemeClr val="bg2"/>
+            </a:solidFill>
+          </a:ln>
+        </p:spPr>
+        <p:style>
+          <a:lnRef idx="2">
+            <a:schemeClr val="accent1">
+              <a:shade val="50000"/>
+            </a:schemeClr>
+          </a:lnRef>
+          <a:fillRef idx="1">
+            <a:schemeClr val="accent1"/>
+          </a:fillRef>
+          <a:effectRef idx="0">
+            <a:schemeClr val="accent1"/>
+          </a:effectRef>
+          <a:fontRef idx="minor">
+            <a:schemeClr val="lt1"/>
+          </a:fontRef>
+        </p:style>
+        <p:txBody>
+          <a:bodyPr rtlCol="0" anchor="ctr"/>
+          <a:lstStyle/>
+          <a:p>
+            <a:pPr algn="ctr"/>
+            <a:endParaRPr lang="de-DE" dirty="0"/>
+          </a:p>
+        </p:txBody>
+      </p:sp>
+      <p:sp>
+        <p:nvSpPr>
+          <p:cNvPr id="65" name="Textfeld 64">
+            <a:extLst>
+              <a:ext uri="{FF2B5EF4-FFF2-40B4-BE49-F238E27FC236}">
+                <a16:creationId xmlns:a16="http://schemas.microsoft.com/office/drawing/2014/main" id="{1884B99F-A879-4C4A-A1E2-221BEE04F31F}"/>
+              </a:ext>
+            </a:extLst>
+          </p:cNvPr>
+          <p:cNvSpPr txBox="1"/>
+          <p:nvPr/>
+        </p:nvSpPr>
+        <p:spPr>
+          <a:xfrm>
+            <a:off x="5465103" y="1772816"/>
+            <a:ext cx="1598194" cy="246221"/>
+          </a:xfrm>
+          <a:prstGeom prst="rect">
+            <a:avLst/>
+          </a:prstGeom>
+          <a:noFill/>
+        </p:spPr>
+        <p:txBody>
+          <a:bodyPr wrap="none" lIns="0" tIns="0" rIns="0" bIns="0" rtlCol="0">
+            <a:spAutoFit/>
+          </a:bodyPr>
+          <a:lstStyle/>
+          <a:p>
+            <a:r>
+              <a:rPr lang="de-DE" sz="1600" b="1" dirty="0">
+                <a:latin typeface="Arial" pitchFamily="34" charset="0"/>
+                <a:cs typeface="Arial" pitchFamily="34" charset="0"/>
+              </a:rPr>
+              <a:t>List&lt;</a:t>
+            </a:r>
+            <a:r>
+              <a:rPr lang="de-DE" sz="1600" dirty="0">
+                <a:latin typeface="Arial" pitchFamily="34" charset="0"/>
+                <a:cs typeface="Arial" pitchFamily="34" charset="0"/>
+              </a:rPr>
+              <a:t>List</a:t>
+            </a:r>
+            <a:r>
+              <a:rPr lang="de-DE" sz="1600" b="1" dirty="0">
+                <a:latin typeface="Arial" pitchFamily="34" charset="0"/>
+                <a:cs typeface="Arial" pitchFamily="34" charset="0"/>
+              </a:rPr>
+              <a:t>&gt; </a:t>
+            </a:r>
+            <a:r>
+              <a:rPr lang="de-DE" sz="1600" b="1" i="1" dirty="0">
+                <a:latin typeface="Arial" pitchFamily="34" charset="0"/>
+                <a:cs typeface="Arial" pitchFamily="34" charset="0"/>
+              </a:rPr>
+              <a:t>bpList</a:t>
+            </a:r>
+          </a:p>
+        </p:txBody>
+      </p:sp>
+      <p:sp>
+        <p:nvSpPr>
+          <p:cNvPr id="66" name="Rechteck 65">
+            <a:extLst>
+              <a:ext uri="{FF2B5EF4-FFF2-40B4-BE49-F238E27FC236}">
+                <a16:creationId xmlns:a16="http://schemas.microsoft.com/office/drawing/2014/main" id="{D8C3923D-4975-4C93-BE49-5C1F23175259}"/>
+              </a:ext>
+            </a:extLst>
+          </p:cNvPr>
+          <p:cNvSpPr/>
+          <p:nvPr/>
+        </p:nvSpPr>
+        <p:spPr>
+          <a:xfrm>
+            <a:off x="5537111" y="2141488"/>
+            <a:ext cx="273682" cy="274321"/>
+          </a:xfrm>
+          <a:prstGeom prst="rect">
+            <a:avLst/>
+          </a:prstGeom>
+          <a:solidFill>
+            <a:schemeClr val="accent6"/>
+          </a:solidFill>
+          <a:ln w="9525">
+            <a:noFill/>
+          </a:ln>
+        </p:spPr>
+        <p:style>
+          <a:lnRef idx="2">
+            <a:schemeClr val="accent1">
+              <a:shade val="50000"/>
+            </a:schemeClr>
+          </a:lnRef>
+          <a:fillRef idx="1">
+            <a:schemeClr val="accent1"/>
+          </a:fillRef>
+          <a:effectRef idx="0">
+            <a:schemeClr val="accent1"/>
+          </a:effectRef>
+          <a:fontRef idx="minor">
+            <a:schemeClr val="lt1"/>
+          </a:fontRef>
+        </p:style>
+        <p:txBody>
+          <a:bodyPr rtlCol="0" anchor="ctr"/>
+          <a:lstStyle/>
+          <a:p>
+            <a:pPr algn="ctr"/>
+            <a:r>
+              <a:rPr lang="de-DE" dirty="0"/>
+              <a:t>1</a:t>
+            </a:r>
+          </a:p>
+        </p:txBody>
+      </p:sp>
+      <p:sp>
+        <p:nvSpPr>
+          <p:cNvPr id="67" name="Rechteck 66">
+            <a:extLst>
+              <a:ext uri="{FF2B5EF4-FFF2-40B4-BE49-F238E27FC236}">
+                <a16:creationId xmlns:a16="http://schemas.microsoft.com/office/drawing/2014/main" id="{29F4272C-A06C-4781-BEBA-5469B90764A4}"/>
+              </a:ext>
+            </a:extLst>
+          </p:cNvPr>
+          <p:cNvSpPr/>
+          <p:nvPr/>
+        </p:nvSpPr>
+        <p:spPr>
+          <a:xfrm>
+            <a:off x="5886923" y="2137783"/>
+            <a:ext cx="273682" cy="274321"/>
+          </a:xfrm>
+          <a:prstGeom prst="rect">
+            <a:avLst/>
+          </a:prstGeom>
+          <a:solidFill>
+            <a:schemeClr val="accent6"/>
+          </a:solidFill>
+          <a:ln w="9525">
+            <a:noFill/>
+          </a:ln>
+        </p:spPr>
+        <p:style>
+          <a:lnRef idx="2">
+            <a:schemeClr val="accent1">
+              <a:shade val="50000"/>
+            </a:schemeClr>
+          </a:lnRef>
+          <a:fillRef idx="1">
+            <a:schemeClr val="accent1"/>
+          </a:fillRef>
+          <a:effectRef idx="0">
+            <a:schemeClr val="accent1"/>
+          </a:effectRef>
+          <a:fontRef idx="minor">
+            <a:schemeClr val="lt1"/>
+          </a:fontRef>
+        </p:style>
+        <p:txBody>
+          <a:bodyPr rtlCol="0" anchor="ctr"/>
+          <a:lstStyle/>
+          <a:p>
+            <a:pPr algn="ctr"/>
+            <a:r>
+              <a:rPr lang="de-DE" dirty="0"/>
+              <a:t>2</a:t>
+            </a:r>
+          </a:p>
+        </p:txBody>
+      </p:sp>
+      <p:sp>
+        <p:nvSpPr>
+          <p:cNvPr id="68" name="Rechteck 67">
+            <a:extLst>
+              <a:ext uri="{FF2B5EF4-FFF2-40B4-BE49-F238E27FC236}">
+                <a16:creationId xmlns:a16="http://schemas.microsoft.com/office/drawing/2014/main" id="{694F4903-A8DD-4762-AE64-3CEB5D1C8AEE}"/>
+              </a:ext>
+            </a:extLst>
+          </p:cNvPr>
+          <p:cNvSpPr/>
+          <p:nvPr/>
+        </p:nvSpPr>
+        <p:spPr>
+          <a:xfrm>
+            <a:off x="6232613" y="2137783"/>
+            <a:ext cx="273682" cy="274321"/>
+          </a:xfrm>
+          <a:prstGeom prst="rect">
+            <a:avLst/>
+          </a:prstGeom>
+          <a:solidFill>
+            <a:schemeClr val="accent6"/>
+          </a:solidFill>
+          <a:ln w="9525">
+            <a:noFill/>
+          </a:ln>
+        </p:spPr>
+        <p:style>
+          <a:lnRef idx="2">
+            <a:schemeClr val="accent1">
+              <a:shade val="50000"/>
+            </a:schemeClr>
+          </a:lnRef>
+          <a:fillRef idx="1">
+            <a:schemeClr val="accent1"/>
+          </a:fillRef>
+          <a:effectRef idx="0">
+            <a:schemeClr val="accent1"/>
+          </a:effectRef>
+          <a:fontRef idx="minor">
+            <a:schemeClr val="lt1"/>
+          </a:fontRef>
+        </p:style>
+        <p:txBody>
+          <a:bodyPr rtlCol="0" anchor="ctr"/>
+          <a:lstStyle/>
+          <a:p>
+            <a:pPr algn="ctr"/>
+            <a:r>
+              <a:rPr lang="de-DE" dirty="0"/>
+              <a:t>3</a:t>
+            </a:r>
+          </a:p>
+        </p:txBody>
+      </p:sp>
+      <p:sp>
+        <p:nvSpPr>
+          <p:cNvPr id="69" name="Textfeld 68">
+            <a:extLst>
+              <a:ext uri="{FF2B5EF4-FFF2-40B4-BE49-F238E27FC236}">
+                <a16:creationId xmlns:a16="http://schemas.microsoft.com/office/drawing/2014/main" id="{400F9477-D34A-4059-BFA9-B9F530940B7B}"/>
+              </a:ext>
+            </a:extLst>
+          </p:cNvPr>
+          <p:cNvSpPr txBox="1"/>
+          <p:nvPr/>
+        </p:nvSpPr>
+        <p:spPr>
+          <a:xfrm>
+            <a:off x="6578303" y="2194776"/>
+            <a:ext cx="205184" cy="246221"/>
+          </a:xfrm>
+          <a:prstGeom prst="rect">
+            <a:avLst/>
+          </a:prstGeom>
+          <a:noFill/>
+        </p:spPr>
+        <p:txBody>
+          <a:bodyPr wrap="none" lIns="0" tIns="0" rIns="0" bIns="0" rtlCol="0">
+            <a:spAutoFit/>
+          </a:bodyPr>
+          <a:lstStyle/>
+          <a:p>
+            <a:r>
+              <a:rPr lang="de-DE" sz="1600" dirty="0">
+                <a:latin typeface="Arial" pitchFamily="34" charset="0"/>
+                <a:cs typeface="Arial" pitchFamily="34" charset="0"/>
+              </a:rPr>
+              <a:t>…</a:t>
+            </a:r>
+          </a:p>
+        </p:txBody>
+      </p:sp>
+      <p:sp>
+        <p:nvSpPr>
+          <p:cNvPr id="70" name="Pfeil: nach unten 69">
+            <a:extLst>
+              <a:ext uri="{FF2B5EF4-FFF2-40B4-BE49-F238E27FC236}">
+                <a16:creationId xmlns:a16="http://schemas.microsoft.com/office/drawing/2014/main" id="{0ABA52CA-87DA-4367-B3C6-7C7707F82BD7}"/>
+              </a:ext>
+            </a:extLst>
+          </p:cNvPr>
+          <p:cNvSpPr/>
+          <p:nvPr/>
+        </p:nvSpPr>
+        <p:spPr>
+          <a:xfrm>
+            <a:off x="5561011" y="2397233"/>
+            <a:ext cx="237024" cy="359719"/>
+          </a:xfrm>
+          <a:prstGeom prst="downArrow">
+            <a:avLst/>
+          </a:prstGeom>
+          <a:solidFill>
+            <a:schemeClr val="accent6"/>
+          </a:solidFill>
+          <a:ln w="9525">
+            <a:noFill/>
+          </a:ln>
+        </p:spPr>
+        <p:style>
+          <a:lnRef idx="2">
+            <a:schemeClr val="accent1">
+              <a:shade val="50000"/>
+            </a:schemeClr>
+          </a:lnRef>
+          <a:fillRef idx="1">
+            <a:schemeClr val="accent1"/>
+          </a:fillRef>
+          <a:effectRef idx="0">
+            <a:schemeClr val="accent1"/>
+          </a:effectRef>
+          <a:fontRef idx="minor">
+            <a:schemeClr val="lt1"/>
+          </a:fontRef>
+        </p:style>
+        <p:txBody>
+          <a:bodyPr rtlCol="0" anchor="ctr"/>
+          <a:lstStyle/>
+          <a:p>
+            <a:pPr algn="ctr"/>
+            <a:endParaRPr lang="de-DE" dirty="0"/>
+          </a:p>
+        </p:txBody>
+      </p:sp>
+      <p:sp>
+        <p:nvSpPr>
+          <p:cNvPr id="71" name="Rechteck 70">
+            <a:extLst>
+              <a:ext uri="{FF2B5EF4-FFF2-40B4-BE49-F238E27FC236}">
+                <a16:creationId xmlns:a16="http://schemas.microsoft.com/office/drawing/2014/main" id="{0FB55BB9-1788-4308-87DC-63514C30D383}"/>
+              </a:ext>
+            </a:extLst>
+          </p:cNvPr>
+          <p:cNvSpPr/>
+          <p:nvPr/>
+        </p:nvSpPr>
+        <p:spPr>
+          <a:xfrm rot="16200000">
+            <a:off x="5086589" y="3196094"/>
+            <a:ext cx="1184574" cy="289350"/>
+          </a:xfrm>
+          <a:prstGeom prst="rect">
+            <a:avLst/>
+          </a:prstGeom>
+          <a:noFill/>
+          <a:ln w="19050">
+            <a:solidFill>
+              <a:schemeClr val="bg2"/>
+            </a:solidFill>
+          </a:ln>
+        </p:spPr>
+        <p:style>
+          <a:lnRef idx="2">
+            <a:schemeClr val="accent1">
+              <a:shade val="50000"/>
+            </a:schemeClr>
+          </a:lnRef>
+          <a:fillRef idx="1">
+            <a:schemeClr val="accent1"/>
+          </a:fillRef>
+          <a:effectRef idx="0">
+            <a:schemeClr val="accent1"/>
+          </a:effectRef>
+          <a:fontRef idx="minor">
+            <a:schemeClr val="lt1"/>
+          </a:fontRef>
+        </p:style>
+        <p:txBody>
+          <a:bodyPr rtlCol="0" anchor="ctr"/>
+          <a:lstStyle/>
+          <a:p>
+            <a:r>
+              <a:rPr lang="de-DE" dirty="0">
+                <a:solidFill>
+                  <a:schemeClr val="tx1"/>
+                </a:solidFill>
+              </a:rPr>
+              <a:t>...</a:t>
+            </a:r>
+          </a:p>
+        </p:txBody>
+      </p:sp>
+      <p:sp>
+        <p:nvSpPr>
+          <p:cNvPr id="72" name="Rechteck 71">
+            <a:extLst>
+              <a:ext uri="{FF2B5EF4-FFF2-40B4-BE49-F238E27FC236}">
+                <a16:creationId xmlns:a16="http://schemas.microsoft.com/office/drawing/2014/main" id="{69A1E3C3-9328-4B9A-8555-F9549275A90F}"/>
+              </a:ext>
+            </a:extLst>
+          </p:cNvPr>
+          <p:cNvSpPr/>
+          <p:nvPr/>
+        </p:nvSpPr>
+        <p:spPr>
+          <a:xfrm>
+            <a:off x="5574570" y="2799506"/>
+            <a:ext cx="198764" cy="174099"/>
+          </a:xfrm>
+          <a:prstGeom prst="rect">
+            <a:avLst/>
+          </a:prstGeom>
+          <a:solidFill>
+            <a:schemeClr val="accent6"/>
+          </a:solidFill>
+          <a:ln w="9525">
+            <a:noFill/>
+          </a:ln>
+        </p:spPr>
+        <p:style>
+          <a:lnRef idx="2">
+            <a:schemeClr val="accent1">
+              <a:shade val="50000"/>
+            </a:schemeClr>
+          </a:lnRef>
+          <a:fillRef idx="1">
+            <a:schemeClr val="accent1"/>
+          </a:fillRef>
+          <a:effectRef idx="0">
+            <a:schemeClr val="accent1"/>
+          </a:effectRef>
+          <a:fontRef idx="minor">
+            <a:schemeClr val="lt1"/>
+          </a:fontRef>
+        </p:style>
+        <p:txBody>
+          <a:bodyPr rtlCol="0" anchor="ctr"/>
+          <a:lstStyle/>
+          <a:p>
+            <a:pPr algn="ctr"/>
+            <a:endParaRPr lang="de-DE" dirty="0"/>
+          </a:p>
+        </p:txBody>
+      </p:sp>
+      <p:sp>
+        <p:nvSpPr>
+          <p:cNvPr id="73" name="Rechteck 72">
+            <a:extLst>
+              <a:ext uri="{FF2B5EF4-FFF2-40B4-BE49-F238E27FC236}">
+                <a16:creationId xmlns:a16="http://schemas.microsoft.com/office/drawing/2014/main" id="{BC9D66C5-F72D-4F3C-835B-155C8C719085}"/>
+              </a:ext>
+            </a:extLst>
+          </p:cNvPr>
+          <p:cNvSpPr/>
+          <p:nvPr/>
+        </p:nvSpPr>
+        <p:spPr>
+          <a:xfrm>
+            <a:off x="5574570" y="3084624"/>
+            <a:ext cx="198764" cy="174099"/>
+          </a:xfrm>
+          <a:prstGeom prst="rect">
+            <a:avLst/>
+          </a:prstGeom>
+          <a:solidFill>
+            <a:schemeClr val="accent6"/>
+          </a:solidFill>
+          <a:ln w="9525">
+            <a:noFill/>
+          </a:ln>
+        </p:spPr>
+        <p:style>
+          <a:lnRef idx="2">
+            <a:schemeClr val="accent1">
+              <a:shade val="50000"/>
+            </a:schemeClr>
+          </a:lnRef>
+          <a:fillRef idx="1">
+            <a:schemeClr val="accent1"/>
+          </a:fillRef>
+          <a:effectRef idx="0">
+            <a:schemeClr val="accent1"/>
+          </a:effectRef>
+          <a:fontRef idx="minor">
+            <a:schemeClr val="lt1"/>
+          </a:fontRef>
+        </p:style>
+        <p:txBody>
+          <a:bodyPr rtlCol="0" anchor="ctr"/>
+          <a:lstStyle/>
+          <a:p>
+            <a:pPr algn="ctr"/>
+            <a:endParaRPr lang="de-DE" dirty="0"/>
+          </a:p>
+        </p:txBody>
+      </p:sp>
+      <p:sp>
+        <p:nvSpPr>
+          <p:cNvPr id="74" name="Pfeil: nach unten 73">
+            <a:extLst>
+              <a:ext uri="{FF2B5EF4-FFF2-40B4-BE49-F238E27FC236}">
+                <a16:creationId xmlns:a16="http://schemas.microsoft.com/office/drawing/2014/main" id="{AC48EC16-1FB4-4750-AAA6-6B6D49B6C956}"/>
+              </a:ext>
+            </a:extLst>
+          </p:cNvPr>
+          <p:cNvSpPr/>
+          <p:nvPr/>
+        </p:nvSpPr>
+        <p:spPr>
+          <a:xfrm>
+            <a:off x="5909570" y="2397272"/>
+            <a:ext cx="237024" cy="359719"/>
+          </a:xfrm>
+          <a:prstGeom prst="downArrow">
+            <a:avLst/>
+          </a:prstGeom>
+          <a:solidFill>
+            <a:schemeClr val="accent6"/>
+          </a:solidFill>
+          <a:ln w="9525">
+            <a:noFill/>
+          </a:ln>
+        </p:spPr>
+        <p:style>
+          <a:lnRef idx="2">
+            <a:schemeClr val="accent1">
+              <a:shade val="50000"/>
+            </a:schemeClr>
+          </a:lnRef>
+          <a:fillRef idx="1">
+            <a:schemeClr val="accent1"/>
+          </a:fillRef>
+          <a:effectRef idx="0">
+            <a:schemeClr val="accent1"/>
+          </a:effectRef>
+          <a:fontRef idx="minor">
+            <a:schemeClr val="lt1"/>
+          </a:fontRef>
+        </p:style>
+        <p:txBody>
+          <a:bodyPr rtlCol="0" anchor="ctr"/>
+          <a:lstStyle/>
+          <a:p>
+            <a:pPr algn="ctr"/>
+            <a:endParaRPr lang="de-DE" dirty="0"/>
+          </a:p>
+        </p:txBody>
+      </p:sp>
+      <p:sp>
+        <p:nvSpPr>
+          <p:cNvPr id="75" name="Textfeld 74">
+            <a:extLst>
+              <a:ext uri="{FF2B5EF4-FFF2-40B4-BE49-F238E27FC236}">
+                <a16:creationId xmlns:a16="http://schemas.microsoft.com/office/drawing/2014/main" id="{3271E7CD-9617-4803-8A86-20C27784CF48}"/>
+              </a:ext>
+            </a:extLst>
+          </p:cNvPr>
+          <p:cNvSpPr txBox="1"/>
+          <p:nvPr/>
+        </p:nvSpPr>
+        <p:spPr>
+          <a:xfrm rot="16200000">
+            <a:off x="4602240" y="3305889"/>
+            <a:ext cx="1572546" cy="246221"/>
+          </a:xfrm>
+          <a:prstGeom prst="rect">
+            <a:avLst/>
+          </a:prstGeom>
+          <a:noFill/>
+        </p:spPr>
+        <p:txBody>
+          <a:bodyPr wrap="none" lIns="0" tIns="0" rIns="0" bIns="0" rtlCol="0">
+            <a:spAutoFit/>
+          </a:bodyPr>
+          <a:lstStyle/>
+          <a:p>
+            <a:r>
+              <a:rPr lang="de-DE" sz="1600" b="1" dirty="0">
+                <a:latin typeface="Arial" pitchFamily="34" charset="0"/>
+                <a:cs typeface="Arial" pitchFamily="34" charset="0"/>
+              </a:rPr>
+              <a:t>List&lt;</a:t>
+            </a:r>
+            <a:r>
+              <a:rPr lang="de-DE" sz="1600" dirty="0">
+                <a:latin typeface="Arial" pitchFamily="34" charset="0"/>
+                <a:cs typeface="Arial" pitchFamily="34" charset="0"/>
+              </a:rPr>
+              <a:t>Boilerplate</a:t>
+            </a:r>
+            <a:r>
+              <a:rPr lang="de-DE" sz="1600" b="1" dirty="0">
+                <a:latin typeface="Arial" pitchFamily="34" charset="0"/>
+                <a:cs typeface="Arial" pitchFamily="34" charset="0"/>
+              </a:rPr>
+              <a:t>&gt;</a:t>
+            </a:r>
+          </a:p>
+        </p:txBody>
+      </p:sp>
+      <p:cxnSp>
+        <p:nvCxnSpPr>
+          <p:cNvPr id="76" name="Gerade Verbindung mit Pfeil 75">
+            <a:extLst>
+              <a:ext uri="{FF2B5EF4-FFF2-40B4-BE49-F238E27FC236}">
+                <a16:creationId xmlns:a16="http://schemas.microsoft.com/office/drawing/2014/main" id="{DC4E0549-04A8-4991-81D1-0663E15C63A9}"/>
+              </a:ext>
+            </a:extLst>
+          </p:cNvPr>
+          <p:cNvCxnSpPr>
+            <a:cxnSpLocks/>
+            <a:stCxn id="77" idx="3"/>
+            <a:endCxn id="64" idx="1"/>
+          </p:cNvCxnSpPr>
+          <p:nvPr/>
+        </p:nvCxnSpPr>
+        <p:spPr>
+          <a:xfrm>
+            <a:off x="5248613" y="2274943"/>
+            <a:ext cx="216490" cy="3707"/>
+          </a:xfrm>
+          <a:prstGeom prst="straightConnector1">
+            <a:avLst/>
+          </a:prstGeom>
+          <a:ln>
+            <a:solidFill>
+              <a:schemeClr val="tx1"/>
+            </a:solidFill>
+            <a:tailEnd type="triangle"/>
+          </a:ln>
+        </p:spPr>
+        <p:style>
+          <a:lnRef idx="1">
+            <a:schemeClr val="accent1"/>
+          </a:lnRef>
+          <a:fillRef idx="0">
+            <a:schemeClr val="accent1"/>
+          </a:fillRef>
+          <a:effectRef idx="0">
+            <a:schemeClr val="accent1"/>
+          </a:effectRef>
+          <a:fontRef idx="minor">
+            <a:schemeClr val="tx1"/>
+          </a:fontRef>
+        </p:style>
+      </p:cxnSp>
+      <p:sp>
+        <p:nvSpPr>
+          <p:cNvPr id="77" name="Textfeld 76">
+            <a:extLst>
+              <a:ext uri="{FF2B5EF4-FFF2-40B4-BE49-F238E27FC236}">
+                <a16:creationId xmlns:a16="http://schemas.microsoft.com/office/drawing/2014/main" id="{E6AFF3D5-A208-4EB4-A223-48ADA1912B03}"/>
+              </a:ext>
+            </a:extLst>
+          </p:cNvPr>
+          <p:cNvSpPr txBox="1"/>
+          <p:nvPr/>
+        </p:nvSpPr>
+        <p:spPr>
+          <a:xfrm>
+            <a:off x="4790154" y="2167221"/>
+            <a:ext cx="458459" cy="215444"/>
+          </a:xfrm>
+          <a:prstGeom prst="rect">
+            <a:avLst/>
+          </a:prstGeom>
+          <a:noFill/>
+        </p:spPr>
+        <p:txBody>
+          <a:bodyPr wrap="none" lIns="0" tIns="0" rIns="0" bIns="0" rtlCol="0">
+            <a:spAutoFit/>
+          </a:bodyPr>
+          <a:lstStyle/>
+          <a:p>
+            <a:r>
+              <a:rPr lang="de-DE" sz="1400" i="1" dirty="0">
+                <a:latin typeface="Arial" pitchFamily="34" charset="0"/>
+                <a:cs typeface="Arial" pitchFamily="34" charset="0"/>
+              </a:rPr>
+              <a:t>Sätze</a:t>
+            </a:r>
+          </a:p>
+        </p:txBody>
+      </p:sp>
+      <p:sp>
+        <p:nvSpPr>
+          <p:cNvPr id="78" name="Textfeld 77">
+            <a:extLst>
+              <a:ext uri="{FF2B5EF4-FFF2-40B4-BE49-F238E27FC236}">
+                <a16:creationId xmlns:a16="http://schemas.microsoft.com/office/drawing/2014/main" id="{28BD931C-7218-405E-831C-EA756E04768B}"/>
+              </a:ext>
+            </a:extLst>
+          </p:cNvPr>
+          <p:cNvSpPr txBox="1"/>
+          <p:nvPr/>
+        </p:nvSpPr>
+        <p:spPr>
+          <a:xfrm>
+            <a:off x="6096000" y="3239808"/>
+            <a:ext cx="2069477" cy="430887"/>
+          </a:xfrm>
+          <a:prstGeom prst="rect">
+            <a:avLst/>
+          </a:prstGeom>
+          <a:noFill/>
+          <a:ln>
+            <a:solidFill>
+              <a:schemeClr val="bg2"/>
+            </a:solidFill>
+          </a:ln>
+        </p:spPr>
+        <p:txBody>
+          <a:bodyPr wrap="none" lIns="0" tIns="0" rIns="0" bIns="0" rtlCol="0">
+            <a:spAutoFit/>
+          </a:bodyPr>
+          <a:lstStyle/>
+          <a:p>
+            <a:r>
+              <a:rPr lang="de-DE" sz="1400" i="1" dirty="0">
+                <a:latin typeface="Arial" pitchFamily="34" charset="0"/>
+                <a:cs typeface="Arial" pitchFamily="34" charset="0"/>
+              </a:rPr>
+              <a:t>Boilerplate-Konvertierung </a:t>
+            </a:r>
+            <a:br>
+              <a:rPr lang="de-DE" sz="1400" i="1" dirty="0">
+                <a:latin typeface="Arial" pitchFamily="34" charset="0"/>
+                <a:cs typeface="Arial" pitchFamily="34" charset="0"/>
+              </a:rPr>
+            </a:br>
+            <a:r>
+              <a:rPr lang="de-DE" sz="1400" i="1" dirty="0">
+                <a:latin typeface="Arial" pitchFamily="34" charset="0"/>
+                <a:cs typeface="Arial" pitchFamily="34" charset="0"/>
+              </a:rPr>
+              <a:t>1-n zum Satz</a:t>
+            </a:r>
+          </a:p>
+        </p:txBody>
+      </p:sp>
+      <p:cxnSp>
+        <p:nvCxnSpPr>
+          <p:cNvPr id="81" name="Gerade Verbindung mit Pfeil 80">
+            <a:extLst>
+              <a:ext uri="{FF2B5EF4-FFF2-40B4-BE49-F238E27FC236}">
+                <a16:creationId xmlns:a16="http://schemas.microsoft.com/office/drawing/2014/main" id="{6A085FF2-87C9-4823-8D3E-6FB3EBBCA407}"/>
+              </a:ext>
+            </a:extLst>
+          </p:cNvPr>
+          <p:cNvCxnSpPr>
+            <a:cxnSpLocks/>
+            <a:stCxn id="78" idx="1"/>
+            <a:endCxn id="72" idx="3"/>
+          </p:cNvCxnSpPr>
+          <p:nvPr/>
+        </p:nvCxnSpPr>
+        <p:spPr>
+          <a:xfrm flipH="1" flipV="1">
+            <a:off x="5773334" y="2886556"/>
+            <a:ext cx="322666" cy="568696"/>
+          </a:xfrm>
+          <a:prstGeom prst="straightConnector1">
+            <a:avLst/>
+          </a:prstGeom>
+          <a:ln>
+            <a:solidFill>
+              <a:schemeClr val="tx1"/>
+            </a:solidFill>
+            <a:tailEnd type="triangle"/>
+          </a:ln>
+        </p:spPr>
+        <p:style>
+          <a:lnRef idx="1">
+            <a:schemeClr val="accent1"/>
+          </a:lnRef>
+          <a:fillRef idx="0">
+            <a:schemeClr val="accent1"/>
+          </a:fillRef>
+          <a:effectRef idx="0">
+            <a:schemeClr val="accent1"/>
+          </a:effectRef>
+          <a:fontRef idx="minor">
+            <a:schemeClr val="tx1"/>
+          </a:fontRef>
+        </p:style>
+      </p:cxnSp>
+      <p:sp>
+        <p:nvSpPr>
+          <p:cNvPr id="82" name="Textfeld 81">
+            <a:extLst>
+              <a:ext uri="{FF2B5EF4-FFF2-40B4-BE49-F238E27FC236}">
+                <a16:creationId xmlns:a16="http://schemas.microsoft.com/office/drawing/2014/main" id="{C115E6DA-D014-45AD-9FD8-BCEE292D3E1C}"/>
+              </a:ext>
+            </a:extLst>
+          </p:cNvPr>
+          <p:cNvSpPr txBox="1"/>
+          <p:nvPr/>
+        </p:nvSpPr>
+        <p:spPr>
+          <a:xfrm rot="16200000">
+            <a:off x="5917723" y="2735477"/>
+            <a:ext cx="205184" cy="246221"/>
+          </a:xfrm>
+          <a:prstGeom prst="rect">
+            <a:avLst/>
+          </a:prstGeom>
+          <a:noFill/>
+        </p:spPr>
+        <p:txBody>
+          <a:bodyPr wrap="none" lIns="0" tIns="0" rIns="0" bIns="0" rtlCol="0">
+            <a:spAutoFit/>
+          </a:bodyPr>
+          <a:lstStyle/>
+          <a:p>
+            <a:r>
+              <a:rPr lang="de-DE" sz="1600" b="1" dirty="0">
+                <a:latin typeface="Arial" pitchFamily="34" charset="0"/>
+                <a:cs typeface="Arial" pitchFamily="34" charset="0"/>
+              </a:rPr>
+              <a:t>…</a:t>
+            </a:r>
+          </a:p>
+        </p:txBody>
+      </p:sp>
+      <p:sp>
+        <p:nvSpPr>
+          <p:cNvPr id="83" name="Rechteck 82">
+            <a:extLst>
+              <a:ext uri="{FF2B5EF4-FFF2-40B4-BE49-F238E27FC236}">
+                <a16:creationId xmlns:a16="http://schemas.microsoft.com/office/drawing/2014/main" id="{4E28FDD8-C8A9-4234-8F9A-952CAA9AA2F7}"/>
+              </a:ext>
+            </a:extLst>
+          </p:cNvPr>
+          <p:cNvSpPr/>
+          <p:nvPr/>
+        </p:nvSpPr>
+        <p:spPr>
+          <a:xfrm>
+            <a:off x="5576565" y="3363709"/>
+            <a:ext cx="198764" cy="174099"/>
+          </a:xfrm>
+          <a:prstGeom prst="rect">
+            <a:avLst/>
+          </a:prstGeom>
+          <a:solidFill>
+            <a:schemeClr val="accent6"/>
+          </a:solidFill>
+          <a:ln w="9525">
+            <a:noFill/>
+          </a:ln>
+        </p:spPr>
+        <p:style>
+          <a:lnRef idx="2">
+            <a:schemeClr val="accent1">
+              <a:shade val="50000"/>
+            </a:schemeClr>
+          </a:lnRef>
+          <a:fillRef idx="1">
+            <a:schemeClr val="accent1"/>
+          </a:fillRef>
+          <a:effectRef idx="0">
+            <a:schemeClr val="accent1"/>
+          </a:effectRef>
+          <a:fontRef idx="minor">
+            <a:schemeClr val="lt1"/>
+          </a:fontRef>
+        </p:style>
+        <p:txBody>
+          <a:bodyPr rtlCol="0" anchor="ctr"/>
+          <a:lstStyle/>
+          <a:p>
+            <a:pPr algn="ctr"/>
+            <a:endParaRPr lang="de-DE" dirty="0"/>
+          </a:p>
+        </p:txBody>
+      </p:sp>
+      <p:cxnSp>
+        <p:nvCxnSpPr>
+          <p:cNvPr id="84" name="Gerade Verbindung mit Pfeil 83">
+            <a:extLst>
+              <a:ext uri="{FF2B5EF4-FFF2-40B4-BE49-F238E27FC236}">
+                <a16:creationId xmlns:a16="http://schemas.microsoft.com/office/drawing/2014/main" id="{F4FFFD15-2D1C-4AA2-AA0A-B4A5A0A8F068}"/>
+              </a:ext>
+            </a:extLst>
+          </p:cNvPr>
+          <p:cNvCxnSpPr>
+            <a:cxnSpLocks/>
+            <a:stCxn id="78" idx="1"/>
+            <a:endCxn id="73" idx="3"/>
+          </p:cNvCxnSpPr>
+          <p:nvPr/>
+        </p:nvCxnSpPr>
+        <p:spPr>
+          <a:xfrm flipH="1" flipV="1">
+            <a:off x="5773334" y="3171674"/>
+            <a:ext cx="322666" cy="283578"/>
+          </a:xfrm>
+          <a:prstGeom prst="straightConnector1">
+            <a:avLst/>
+          </a:prstGeom>
+          <a:ln>
+            <a:solidFill>
+              <a:schemeClr val="tx1"/>
+            </a:solidFill>
+            <a:tailEnd type="triangle"/>
+          </a:ln>
+        </p:spPr>
+        <p:style>
+          <a:lnRef idx="1">
+            <a:schemeClr val="accent1"/>
+          </a:lnRef>
+          <a:fillRef idx="0">
+            <a:schemeClr val="accent1"/>
+          </a:fillRef>
+          <a:effectRef idx="0">
+            <a:schemeClr val="accent1"/>
+          </a:effectRef>
+          <a:fontRef idx="minor">
+            <a:schemeClr val="tx1"/>
+          </a:fontRef>
+        </p:style>
+      </p:cxnSp>
+      <p:sp>
+        <p:nvSpPr>
+          <p:cNvPr id="85" name="Pfeil: nach unten 84">
+            <a:extLst>
+              <a:ext uri="{FF2B5EF4-FFF2-40B4-BE49-F238E27FC236}">
+                <a16:creationId xmlns:a16="http://schemas.microsoft.com/office/drawing/2014/main" id="{0DE43092-081D-4D5C-A6B7-47AB5FA73F73}"/>
+              </a:ext>
+            </a:extLst>
+          </p:cNvPr>
+          <p:cNvSpPr/>
+          <p:nvPr/>
+        </p:nvSpPr>
+        <p:spPr>
+          <a:xfrm>
+            <a:off x="6258129" y="2398677"/>
+            <a:ext cx="237024" cy="359719"/>
+          </a:xfrm>
+          <a:prstGeom prst="downArrow">
+            <a:avLst/>
+          </a:prstGeom>
+          <a:solidFill>
+            <a:schemeClr val="accent6"/>
+          </a:solidFill>
+          <a:ln w="9525">
+            <a:noFill/>
+          </a:ln>
+        </p:spPr>
+        <p:style>
+          <a:lnRef idx="2">
+            <a:schemeClr val="accent1">
+              <a:shade val="50000"/>
+            </a:schemeClr>
+          </a:lnRef>
+          <a:fillRef idx="1">
+            <a:schemeClr val="accent1"/>
+          </a:fillRef>
+          <a:effectRef idx="0">
+            <a:schemeClr val="accent1"/>
+          </a:effectRef>
+          <a:fontRef idx="minor">
+            <a:schemeClr val="lt1"/>
+          </a:fontRef>
+        </p:style>
+        <p:txBody>
+          <a:bodyPr rtlCol="0" anchor="ctr"/>
+          <a:lstStyle/>
+          <a:p>
+            <a:pPr algn="ctr"/>
+            <a:endParaRPr lang="de-DE" dirty="0"/>
+          </a:p>
+        </p:txBody>
+      </p:sp>
+      <p:sp>
+        <p:nvSpPr>
+          <p:cNvPr id="86" name="Textfeld 85">
+            <a:extLst>
+              <a:ext uri="{FF2B5EF4-FFF2-40B4-BE49-F238E27FC236}">
+                <a16:creationId xmlns:a16="http://schemas.microsoft.com/office/drawing/2014/main" id="{691470AB-42A0-4EAA-990E-B4C7FDADBF9E}"/>
+              </a:ext>
+            </a:extLst>
+          </p:cNvPr>
+          <p:cNvSpPr txBox="1"/>
+          <p:nvPr/>
+        </p:nvSpPr>
+        <p:spPr>
+          <a:xfrm rot="16200000">
+            <a:off x="6266282" y="2736882"/>
+            <a:ext cx="205184" cy="246221"/>
+          </a:xfrm>
+          <a:prstGeom prst="rect">
+            <a:avLst/>
+          </a:prstGeom>
+          <a:noFill/>
+        </p:spPr>
+        <p:txBody>
+          <a:bodyPr wrap="none" lIns="0" tIns="0" rIns="0" bIns="0" rtlCol="0">
+            <a:spAutoFit/>
+          </a:bodyPr>
+          <a:lstStyle/>
+          <a:p>
+            <a:r>
+              <a:rPr lang="de-DE" sz="1600" b="1" dirty="0">
+                <a:latin typeface="Arial" pitchFamily="34" charset="0"/>
+                <a:cs typeface="Arial" pitchFamily="34" charset="0"/>
+              </a:rPr>
+              <a:t>…</a:t>
+            </a:r>
+          </a:p>
+        </p:txBody>
+      </p:sp>
+      <p:cxnSp>
+        <p:nvCxnSpPr>
+          <p:cNvPr id="92" name="Gerade Verbindung mit Pfeil 91">
+            <a:extLst>
+              <a:ext uri="{FF2B5EF4-FFF2-40B4-BE49-F238E27FC236}">
+                <a16:creationId xmlns:a16="http://schemas.microsoft.com/office/drawing/2014/main" id="{FCE3D31C-4A25-468C-B0D0-8577328DB819}"/>
+              </a:ext>
+            </a:extLst>
+          </p:cNvPr>
+          <p:cNvCxnSpPr>
+            <a:cxnSpLocks/>
+            <a:stCxn id="78" idx="1"/>
+            <a:endCxn id="83" idx="3"/>
+          </p:cNvCxnSpPr>
+          <p:nvPr/>
+        </p:nvCxnSpPr>
+        <p:spPr>
+          <a:xfrm flipH="1" flipV="1">
+            <a:off x="5775329" y="3450759"/>
+            <a:ext cx="320671" cy="4493"/>
+          </a:xfrm>
+          <a:prstGeom prst="straightConnector1">
+            <a:avLst/>
+          </a:prstGeom>
+          <a:ln>
+            <a:solidFill>
+              <a:schemeClr val="tx1"/>
+            </a:solidFill>
+            <a:tailEnd type="triangle"/>
+          </a:ln>
+        </p:spPr>
+        <p:style>
+          <a:lnRef idx="1">
+            <a:schemeClr val="accent1"/>
+          </a:lnRef>
+          <a:fillRef idx="0">
+            <a:schemeClr val="accent1"/>
+          </a:fillRef>
+          <a:effectRef idx="0">
+            <a:schemeClr val="accent1"/>
+          </a:effectRef>
+          <a:fontRef idx="minor">
+            <a:schemeClr val="tx1"/>
+          </a:fontRef>
+        </p:style>
+      </p:cxnSp>
+      <p:sp>
+        <p:nvSpPr>
+          <p:cNvPr id="110" name="Pfeil: nach rechts 109">
+            <a:extLst>
+              <a:ext uri="{FF2B5EF4-FFF2-40B4-BE49-F238E27FC236}">
+                <a16:creationId xmlns:a16="http://schemas.microsoft.com/office/drawing/2014/main" id="{07136F50-A6C7-4FF2-93D4-E9E4D0981B63}"/>
+              </a:ext>
+            </a:extLst>
+          </p:cNvPr>
+          <p:cNvSpPr/>
+          <p:nvPr/>
+        </p:nvSpPr>
+        <p:spPr>
+          <a:xfrm rot="5400000" flipV="1">
+            <a:off x="5805144" y="4338353"/>
+            <a:ext cx="1172295" cy="919826"/>
+          </a:xfrm>
+          <a:prstGeom prst="rightArrow">
+            <a:avLst/>
+          </a:prstGeom>
+          <a:solidFill>
+            <a:schemeClr val="accent6"/>
+          </a:solidFill>
+          <a:ln w="9525">
+            <a:noFill/>
+          </a:ln>
+        </p:spPr>
+        <p:style>
+          <a:lnRef idx="2">
+            <a:schemeClr val="accent1">
+              <a:shade val="50000"/>
+            </a:schemeClr>
+          </a:lnRef>
+          <a:fillRef idx="1">
+            <a:schemeClr val="accent1"/>
+          </a:fillRef>
+          <a:effectRef idx="0">
+            <a:schemeClr val="accent1"/>
+          </a:effectRef>
+          <a:fontRef idx="minor">
+            <a:schemeClr val="lt1"/>
+          </a:fontRef>
+        </p:style>
+        <p:txBody>
+          <a:bodyPr rtlCol="0" anchor="ctr"/>
+          <a:lstStyle/>
+          <a:p>
+            <a:pPr algn="ctr"/>
+            <a:r>
+              <a:rPr lang="de-DE" sz="1200" dirty="0">
+                <a:solidFill>
+                  <a:schemeClr val="tx1"/>
+                </a:solidFill>
+              </a:rPr>
+              <a:t>Auswahl</a:t>
+            </a:r>
+          </a:p>
+        </p:txBody>
+      </p:sp>
+      <p:sp>
+        <p:nvSpPr>
+          <p:cNvPr id="111" name="Rechteck 110">
+            <a:extLst>
+              <a:ext uri="{FF2B5EF4-FFF2-40B4-BE49-F238E27FC236}">
+                <a16:creationId xmlns:a16="http://schemas.microsoft.com/office/drawing/2014/main" id="{B3680007-99E3-4345-B2BF-A10745C24B8D}"/>
+              </a:ext>
+            </a:extLst>
+          </p:cNvPr>
+          <p:cNvSpPr/>
+          <p:nvPr/>
+        </p:nvSpPr>
+        <p:spPr>
+          <a:xfrm>
+            <a:off x="5465103" y="5708385"/>
+            <a:ext cx="2232248" cy="435605"/>
+          </a:xfrm>
+          <a:prstGeom prst="rect">
+            <a:avLst/>
+          </a:prstGeom>
+          <a:noFill/>
+          <a:ln w="19050">
+            <a:solidFill>
+              <a:schemeClr val="bg2"/>
+            </a:solidFill>
+          </a:ln>
+        </p:spPr>
+        <p:style>
+          <a:lnRef idx="2">
+            <a:schemeClr val="accent1">
+              <a:shade val="50000"/>
+            </a:schemeClr>
+          </a:lnRef>
+          <a:fillRef idx="1">
+            <a:schemeClr val="accent1"/>
+          </a:fillRef>
+          <a:effectRef idx="0">
+            <a:schemeClr val="accent1"/>
+          </a:effectRef>
+          <a:fontRef idx="minor">
+            <a:schemeClr val="lt1"/>
+          </a:fontRef>
+        </p:style>
+        <p:txBody>
+          <a:bodyPr rtlCol="0" anchor="ctr"/>
+          <a:lstStyle/>
+          <a:p>
+            <a:pPr algn="ctr"/>
+            <a:endParaRPr lang="de-DE" dirty="0"/>
+          </a:p>
+        </p:txBody>
+      </p:sp>
+      <p:sp>
+        <p:nvSpPr>
+          <p:cNvPr id="112" name="Textfeld 111">
+            <a:extLst>
+              <a:ext uri="{FF2B5EF4-FFF2-40B4-BE49-F238E27FC236}">
+                <a16:creationId xmlns:a16="http://schemas.microsoft.com/office/drawing/2014/main" id="{5B2E58F5-91BA-46EC-8FF9-616D0366C1C3}"/>
+              </a:ext>
+            </a:extLst>
+          </p:cNvPr>
+          <p:cNvSpPr txBox="1"/>
+          <p:nvPr/>
+        </p:nvSpPr>
+        <p:spPr>
+          <a:xfrm>
+            <a:off x="5465103" y="5420354"/>
+            <a:ext cx="2895023" cy="246221"/>
+          </a:xfrm>
+          <a:prstGeom prst="rect">
+            <a:avLst/>
+          </a:prstGeom>
+          <a:noFill/>
+        </p:spPr>
+        <p:txBody>
+          <a:bodyPr wrap="none" lIns="0" tIns="0" rIns="0" bIns="0" rtlCol="0">
+            <a:spAutoFit/>
+          </a:bodyPr>
+          <a:lstStyle/>
+          <a:p>
+            <a:r>
+              <a:rPr lang="de-DE" sz="1600" b="1" dirty="0">
+                <a:latin typeface="Arial" pitchFamily="34" charset="0"/>
+                <a:cs typeface="Arial" pitchFamily="34" charset="0"/>
+              </a:rPr>
+              <a:t>List&lt;</a:t>
+            </a:r>
+            <a:r>
+              <a:rPr lang="de-DE" sz="1600" dirty="0">
+                <a:latin typeface="Arial" pitchFamily="34" charset="0"/>
+                <a:cs typeface="Arial" pitchFamily="34" charset="0"/>
+              </a:rPr>
+              <a:t>Boilerplate</a:t>
+            </a:r>
+            <a:r>
+              <a:rPr lang="de-DE" sz="1600" b="1" dirty="0">
+                <a:latin typeface="Arial" pitchFamily="34" charset="0"/>
+                <a:cs typeface="Arial" pitchFamily="34" charset="0"/>
+              </a:rPr>
+              <a:t>&gt; </a:t>
+            </a:r>
+            <a:r>
+              <a:rPr lang="de-DE" sz="1600" b="1" i="1" dirty="0">
+                <a:latin typeface="Arial" pitchFamily="34" charset="0"/>
+                <a:cs typeface="Arial" pitchFamily="34" charset="0"/>
+              </a:rPr>
+              <a:t>bpExportList</a:t>
+            </a:r>
+          </a:p>
+        </p:txBody>
+      </p:sp>
+      <p:sp>
+        <p:nvSpPr>
+          <p:cNvPr id="113" name="Rechteck 112">
+            <a:extLst>
+              <a:ext uri="{FF2B5EF4-FFF2-40B4-BE49-F238E27FC236}">
+                <a16:creationId xmlns:a16="http://schemas.microsoft.com/office/drawing/2014/main" id="{FC211414-875F-4AF1-A918-EC4BAD17ABA5}"/>
+              </a:ext>
+            </a:extLst>
+          </p:cNvPr>
+          <p:cNvSpPr/>
+          <p:nvPr/>
+        </p:nvSpPr>
+        <p:spPr>
+          <a:xfrm>
+            <a:off x="5537111" y="5789026"/>
+            <a:ext cx="273682" cy="274321"/>
+          </a:xfrm>
+          <a:prstGeom prst="rect">
+            <a:avLst/>
+          </a:prstGeom>
+          <a:solidFill>
+            <a:schemeClr val="accent6"/>
+          </a:solidFill>
+          <a:ln w="9525">
+            <a:noFill/>
+          </a:ln>
+        </p:spPr>
+        <p:style>
+          <a:lnRef idx="2">
+            <a:schemeClr val="accent1">
+              <a:shade val="50000"/>
+            </a:schemeClr>
+          </a:lnRef>
+          <a:fillRef idx="1">
+            <a:schemeClr val="accent1"/>
+          </a:fillRef>
+          <a:effectRef idx="0">
+            <a:schemeClr val="accent1"/>
+          </a:effectRef>
+          <a:fontRef idx="minor">
+            <a:schemeClr val="lt1"/>
+          </a:fontRef>
+        </p:style>
+        <p:txBody>
+          <a:bodyPr rtlCol="0" anchor="ctr"/>
+          <a:lstStyle/>
+          <a:p>
+            <a:pPr algn="ctr"/>
+            <a:r>
+              <a:rPr lang="de-DE" dirty="0"/>
+              <a:t>1</a:t>
+            </a:r>
+          </a:p>
+        </p:txBody>
+      </p:sp>
+      <p:sp>
+        <p:nvSpPr>
+          <p:cNvPr id="114" name="Rechteck 113">
+            <a:extLst>
+              <a:ext uri="{FF2B5EF4-FFF2-40B4-BE49-F238E27FC236}">
+                <a16:creationId xmlns:a16="http://schemas.microsoft.com/office/drawing/2014/main" id="{942B3DB7-8049-4758-BD17-06D0A32B68DA}"/>
+              </a:ext>
+            </a:extLst>
+          </p:cNvPr>
+          <p:cNvSpPr/>
+          <p:nvPr/>
+        </p:nvSpPr>
+        <p:spPr>
+          <a:xfrm>
+            <a:off x="5886923" y="5785321"/>
+            <a:ext cx="273682" cy="274321"/>
+          </a:xfrm>
+          <a:prstGeom prst="rect">
+            <a:avLst/>
+          </a:prstGeom>
+          <a:solidFill>
+            <a:schemeClr val="accent6"/>
+          </a:solidFill>
+          <a:ln w="9525">
+            <a:noFill/>
+          </a:ln>
+        </p:spPr>
+        <p:style>
+          <a:lnRef idx="2">
+            <a:schemeClr val="accent1">
+              <a:shade val="50000"/>
+            </a:schemeClr>
+          </a:lnRef>
+          <a:fillRef idx="1">
+            <a:schemeClr val="accent1"/>
+          </a:fillRef>
+          <a:effectRef idx="0">
+            <a:schemeClr val="accent1"/>
+          </a:effectRef>
+          <a:fontRef idx="minor">
+            <a:schemeClr val="lt1"/>
+          </a:fontRef>
+        </p:style>
+        <p:txBody>
+          <a:bodyPr rtlCol="0" anchor="ctr"/>
+          <a:lstStyle/>
+          <a:p>
+            <a:pPr algn="ctr"/>
+            <a:r>
+              <a:rPr lang="de-DE" dirty="0"/>
+              <a:t>2</a:t>
+            </a:r>
+          </a:p>
+        </p:txBody>
+      </p:sp>
+      <p:sp>
+        <p:nvSpPr>
+          <p:cNvPr id="115" name="Rechteck 114">
+            <a:extLst>
+              <a:ext uri="{FF2B5EF4-FFF2-40B4-BE49-F238E27FC236}">
+                <a16:creationId xmlns:a16="http://schemas.microsoft.com/office/drawing/2014/main" id="{A5FB7694-B1C0-4FD8-AE48-5591990F193B}"/>
+              </a:ext>
+            </a:extLst>
+          </p:cNvPr>
+          <p:cNvSpPr/>
+          <p:nvPr/>
+        </p:nvSpPr>
+        <p:spPr>
+          <a:xfrm>
+            <a:off x="6232613" y="5785321"/>
+            <a:ext cx="273682" cy="274321"/>
+          </a:xfrm>
+          <a:prstGeom prst="rect">
+            <a:avLst/>
+          </a:prstGeom>
+          <a:solidFill>
+            <a:schemeClr val="accent6"/>
+          </a:solidFill>
+          <a:ln w="9525">
+            <a:noFill/>
+          </a:ln>
+        </p:spPr>
+        <p:style>
+          <a:lnRef idx="2">
+            <a:schemeClr val="accent1">
+              <a:shade val="50000"/>
+            </a:schemeClr>
+          </a:lnRef>
+          <a:fillRef idx="1">
+            <a:schemeClr val="accent1"/>
+          </a:fillRef>
+          <a:effectRef idx="0">
+            <a:schemeClr val="accent1"/>
+          </a:effectRef>
+          <a:fontRef idx="minor">
+            <a:schemeClr val="lt1"/>
+          </a:fontRef>
+        </p:style>
+        <p:txBody>
+          <a:bodyPr rtlCol="0" anchor="ctr"/>
+          <a:lstStyle/>
+          <a:p>
+            <a:pPr algn="ctr"/>
+            <a:r>
+              <a:rPr lang="de-DE" dirty="0"/>
+              <a:t>3</a:t>
+            </a:r>
+          </a:p>
+        </p:txBody>
+      </p:sp>
+      <p:sp>
+        <p:nvSpPr>
+          <p:cNvPr id="116" name="Textfeld 115">
+            <a:extLst>
+              <a:ext uri="{FF2B5EF4-FFF2-40B4-BE49-F238E27FC236}">
+                <a16:creationId xmlns:a16="http://schemas.microsoft.com/office/drawing/2014/main" id="{C42CC9BC-CB95-4B28-BC1D-72E7BF6E1166}"/>
+              </a:ext>
+            </a:extLst>
+          </p:cNvPr>
+          <p:cNvSpPr txBox="1"/>
+          <p:nvPr/>
+        </p:nvSpPr>
+        <p:spPr>
+          <a:xfrm>
+            <a:off x="6578303" y="5842314"/>
+            <a:ext cx="205184" cy="246221"/>
+          </a:xfrm>
+          <a:prstGeom prst="rect">
+            <a:avLst/>
+          </a:prstGeom>
+          <a:noFill/>
+        </p:spPr>
+        <p:txBody>
+          <a:bodyPr wrap="none" lIns="0" tIns="0" rIns="0" bIns="0" rtlCol="0">
+            <a:spAutoFit/>
+          </a:bodyPr>
+          <a:lstStyle/>
+          <a:p>
+            <a:r>
+              <a:rPr lang="de-DE" sz="1600" dirty="0">
+                <a:latin typeface="Arial" pitchFamily="34" charset="0"/>
+                <a:cs typeface="Arial" pitchFamily="34" charset="0"/>
+              </a:rPr>
+              <a:t>…</a:t>
+            </a:r>
+          </a:p>
+        </p:txBody>
+      </p:sp>
+      <p:cxnSp>
+        <p:nvCxnSpPr>
+          <p:cNvPr id="117" name="Gerade Verbindung mit Pfeil 116">
+            <a:extLst>
+              <a:ext uri="{FF2B5EF4-FFF2-40B4-BE49-F238E27FC236}">
+                <a16:creationId xmlns:a16="http://schemas.microsoft.com/office/drawing/2014/main" id="{AE0DC624-9DAF-4F19-A57E-85762091E14E}"/>
+              </a:ext>
+            </a:extLst>
+          </p:cNvPr>
+          <p:cNvCxnSpPr>
+            <a:cxnSpLocks/>
+            <a:stCxn id="118" idx="3"/>
+            <a:endCxn id="111" idx="1"/>
+          </p:cNvCxnSpPr>
+          <p:nvPr/>
+        </p:nvCxnSpPr>
+        <p:spPr>
+          <a:xfrm>
+            <a:off x="5254193" y="5922481"/>
+            <a:ext cx="210910" cy="3707"/>
+          </a:xfrm>
+          <a:prstGeom prst="straightConnector1">
+            <a:avLst/>
+          </a:prstGeom>
+          <a:ln>
+            <a:solidFill>
+              <a:schemeClr val="tx1"/>
+            </a:solidFill>
+            <a:tailEnd type="triangle"/>
+          </a:ln>
+        </p:spPr>
+        <p:style>
+          <a:lnRef idx="1">
+            <a:schemeClr val="accent1"/>
+          </a:lnRef>
+          <a:fillRef idx="0">
+            <a:schemeClr val="accent1"/>
+          </a:fillRef>
+          <a:effectRef idx="0">
+            <a:schemeClr val="accent1"/>
+          </a:effectRef>
+          <a:fontRef idx="minor">
+            <a:schemeClr val="tx1"/>
+          </a:fontRef>
+        </p:style>
+      </p:cxnSp>
+      <p:sp>
+        <p:nvSpPr>
+          <p:cNvPr id="118" name="Textfeld 117">
+            <a:extLst>
+              <a:ext uri="{FF2B5EF4-FFF2-40B4-BE49-F238E27FC236}">
+                <a16:creationId xmlns:a16="http://schemas.microsoft.com/office/drawing/2014/main" id="{F1BE67CE-DBED-4D49-B89B-04CEFF06F68E}"/>
+              </a:ext>
+            </a:extLst>
+          </p:cNvPr>
+          <p:cNvSpPr txBox="1"/>
+          <p:nvPr/>
+        </p:nvSpPr>
+        <p:spPr>
+          <a:xfrm>
+            <a:off x="3620733" y="5814759"/>
+            <a:ext cx="1633460" cy="215444"/>
+          </a:xfrm>
+          <a:prstGeom prst="rect">
+            <a:avLst/>
+          </a:prstGeom>
+          <a:noFill/>
+        </p:spPr>
+        <p:txBody>
+          <a:bodyPr wrap="none" lIns="0" tIns="0" rIns="0" bIns="0" rtlCol="0">
+            <a:spAutoFit/>
+          </a:bodyPr>
+          <a:lstStyle/>
+          <a:p>
+            <a:r>
+              <a:rPr lang="de-DE" sz="1400" i="1" dirty="0">
+                <a:latin typeface="Arial" pitchFamily="34" charset="0"/>
+                <a:cs typeface="Arial" pitchFamily="34" charset="0"/>
+              </a:rPr>
+              <a:t>Sätze in Boilerplates</a:t>
+            </a:r>
+          </a:p>
+        </p:txBody>
+      </p:sp>
+    </p:spTree>
+    <p:extLst>
+      <p:ext uri="{BB962C8B-B14F-4D97-AF65-F5344CB8AC3E}">
+        <p14:creationId xmlns:p14="http://schemas.microsoft.com/office/powerpoint/2010/main" val="3112896608"/>
+      </p:ext>
+    </p:extLst>
+  </p:cSld>
+  <p:clrMapOvr>
+    <a:masterClrMapping/>
+  </p:clrMapOvr>
+</p:sld>
+</file>
+
+<file path=ppt/slides/slide5.xml><?xml version="1.0" encoding="utf-8"?>
+<p:sld xmlns:a="http://schemas.openxmlformats.org/drawingml/2006/main" xmlns:r="http://schemas.openxmlformats.org/officeDocument/2006/relationships" xmlns:p="http://schemas.openxmlformats.org/presentationml/2006/main">
+  <p:cSld>
+    <p:spTree>
+      <p:nvGrpSpPr>
+        <p:cNvPr id="1" name=""/>
+        <p:cNvGrpSpPr/>
+        <p:nvPr/>
+      </p:nvGrpSpPr>
+      <p:grpSpPr>
+        <a:xfrm>
+          <a:off x="0" y="0"/>
+          <a:ext cx="0" cy="0"/>
+          <a:chOff x="0" y="0"/>
+          <a:chExt cx="0" cy="0"/>
+        </a:xfrm>
+      </p:grpSpPr>
       <p:cxnSp>
         <p:nvCxnSpPr>
           <p:cNvPr id="73" name="Gerade Verbindung mit Pfeil 72">

</xml_diff>